<commit_message>
Edited sequence diagrams for mark, unmark and reset budget feature
</commit_message>
<xml_diff>
--- a/docs/slides/MarkUnmark.pptx
+++ b/docs/slides/MarkUnmark.pptx
@@ -130,7 +130,7 @@
 <file path=ppt/revisionInfo.xml><?xml version="1.0" encoding="utf-8"?>
 <p1510:revInfo xmlns:a="http://schemas.openxmlformats.org/drawingml/2006/main" xmlns:r="http://schemas.openxmlformats.org/officeDocument/2006/relationships" xmlns:p1510="http://schemas.microsoft.com/office/powerpoint/2015/10/main">
   <p1510:revLst>
-    <p1510:client id="{399B34CB-0DE2-46F2-B8AA-609D3AE22DA7}" v="126" dt="2020-03-23T06:35:26.655"/>
+    <p1510:client id="{9168E770-AE40-4547-B7F2-B274C2E98475}" v="4" dt="2020-04-04T03:58:22.887"/>
   </p1510:revLst>
 </p1510:revInfo>
 </file>
@@ -235,6 +235,341 @@
             <pc:docMk/>
             <pc:sldMk cId="1666434637" sldId="270"/>
             <ac:spMk id="47" creationId="{342B431E-151F-4A55-A1AE-57F6FE56D1EF}"/>
+          </ac:spMkLst>
+        </pc:spChg>
+      </pc:sldChg>
+    </pc:docChg>
+  </pc:docChgLst>
+  <pc:docChgLst>
+    <pc:chgData name="Shannon Wong" userId="8c83f3d3550a5322" providerId="LiveId" clId="{9168E770-AE40-4547-B7F2-B274C2E98475}"/>
+    <pc:docChg chg="undo custSel modSld">
+      <pc:chgData name="Shannon Wong" userId="8c83f3d3550a5322" providerId="LiveId" clId="{9168E770-AE40-4547-B7F2-B274C2E98475}" dt="2020-04-04T03:58:57.917" v="115" actId="14100"/>
+      <pc:docMkLst>
+        <pc:docMk/>
+      </pc:docMkLst>
+      <pc:sldChg chg="addSp delSp modSp delAnim modAnim">
+        <pc:chgData name="Shannon Wong" userId="8c83f3d3550a5322" providerId="LiveId" clId="{9168E770-AE40-4547-B7F2-B274C2E98475}" dt="2020-04-04T03:56:38.864" v="73" actId="14100"/>
+        <pc:sldMkLst>
+          <pc:docMk/>
+          <pc:sldMk cId="3228498101" sldId="269"/>
+        </pc:sldMkLst>
+        <pc:spChg chg="mod">
+          <ac:chgData name="Shannon Wong" userId="8c83f3d3550a5322" providerId="LiveId" clId="{9168E770-AE40-4547-B7F2-B274C2E98475}" dt="2020-04-04T03:56:21.918" v="69" actId="14100"/>
+          <ac:spMkLst>
+            <pc:docMk/>
+            <pc:sldMk cId="3228498101" sldId="269"/>
+            <ac:spMk id="5" creationId="{00000000-0000-0000-0000-000000000000}"/>
+          </ac:spMkLst>
+        </pc:spChg>
+        <pc:spChg chg="del">
+          <ac:chgData name="Shannon Wong" userId="8c83f3d3550a5322" providerId="LiveId" clId="{9168E770-AE40-4547-B7F2-B274C2E98475}" dt="2020-04-04T03:53:18.312" v="0" actId="478"/>
+          <ac:spMkLst>
+            <pc:docMk/>
+            <pc:sldMk cId="3228498101" sldId="269"/>
+            <ac:spMk id="17" creationId="{00000000-0000-0000-0000-000000000000}"/>
+          </ac:spMkLst>
+        </pc:spChg>
+        <pc:spChg chg="mod">
+          <ac:chgData name="Shannon Wong" userId="8c83f3d3550a5322" providerId="LiveId" clId="{9168E770-AE40-4547-B7F2-B274C2E98475}" dt="2020-04-04T03:56:31.639" v="71" actId="14100"/>
+          <ac:spMkLst>
+            <pc:docMk/>
+            <pc:sldMk cId="3228498101" sldId="269"/>
+            <ac:spMk id="19" creationId="{00000000-0000-0000-0000-000000000000}"/>
+          </ac:spMkLst>
+        </pc:spChg>
+        <pc:spChg chg="mod">
+          <ac:chgData name="Shannon Wong" userId="8c83f3d3550a5322" providerId="LiveId" clId="{9168E770-AE40-4547-B7F2-B274C2E98475}" dt="2020-04-04T03:53:51.867" v="25" actId="14100"/>
+          <ac:spMkLst>
+            <pc:docMk/>
+            <pc:sldMk cId="3228498101" sldId="269"/>
+            <ac:spMk id="20" creationId="{00000000-0000-0000-0000-000000000000}"/>
+          </ac:spMkLst>
+        </pc:spChg>
+        <pc:spChg chg="mod">
+          <ac:chgData name="Shannon Wong" userId="8c83f3d3550a5322" providerId="LiveId" clId="{9168E770-AE40-4547-B7F2-B274C2E98475}" dt="2020-04-04T03:54:24.650" v="36" actId="14100"/>
+          <ac:spMkLst>
+            <pc:docMk/>
+            <pc:sldMk cId="3228498101" sldId="269"/>
+            <ac:spMk id="24" creationId="{00000000-0000-0000-0000-000000000000}"/>
+          </ac:spMkLst>
+        </pc:spChg>
+        <pc:spChg chg="add mod">
+          <ac:chgData name="Shannon Wong" userId="8c83f3d3550a5322" providerId="LiveId" clId="{9168E770-AE40-4547-B7F2-B274C2E98475}" dt="2020-04-04T03:55:59.809" v="61" actId="14100"/>
+          <ac:spMkLst>
+            <pc:docMk/>
+            <pc:sldMk cId="3228498101" sldId="269"/>
+            <ac:spMk id="30" creationId="{D65DB86A-4CD0-4384-B33D-D4EABF59324B}"/>
+          </ac:spMkLst>
+        </pc:spChg>
+        <pc:spChg chg="add mod">
+          <ac:chgData name="Shannon Wong" userId="8c83f3d3550a5322" providerId="LiveId" clId="{9168E770-AE40-4547-B7F2-B274C2E98475}" dt="2020-04-04T03:55:41.677" v="52" actId="693"/>
+          <ac:spMkLst>
+            <pc:docMk/>
+            <pc:sldMk cId="3228498101" sldId="269"/>
+            <ac:spMk id="31" creationId="{B579E22B-3ECD-43D5-86CC-C70205A05EA8}"/>
+          </ac:spMkLst>
+        </pc:spChg>
+        <pc:spChg chg="mod">
+          <ac:chgData name="Shannon Wong" userId="8c83f3d3550a5322" providerId="LiveId" clId="{9168E770-AE40-4547-B7F2-B274C2E98475}" dt="2020-04-04T03:56:06.904" v="63" actId="14100"/>
+          <ac:spMkLst>
+            <pc:docMk/>
+            <pc:sldMk cId="3228498101" sldId="269"/>
+            <ac:spMk id="33" creationId="{00000000-0000-0000-0000-000000000000}"/>
+          </ac:spMkLst>
+        </pc:spChg>
+        <pc:spChg chg="mod">
+          <ac:chgData name="Shannon Wong" userId="8c83f3d3550a5322" providerId="LiveId" clId="{9168E770-AE40-4547-B7F2-B274C2E98475}" dt="2020-04-04T03:54:00.818" v="28" actId="14100"/>
+          <ac:spMkLst>
+            <pc:docMk/>
+            <pc:sldMk cId="3228498101" sldId="269"/>
+            <ac:spMk id="34" creationId="{00000000-0000-0000-0000-000000000000}"/>
+          </ac:spMkLst>
+        </pc:spChg>
+        <pc:spChg chg="mod">
+          <ac:chgData name="Shannon Wong" userId="8c83f3d3550a5322" providerId="LiveId" clId="{9168E770-AE40-4547-B7F2-B274C2E98475}" dt="2020-04-04T03:53:42.840" v="22" actId="14100"/>
+          <ac:spMkLst>
+            <pc:docMk/>
+            <pc:sldMk cId="3228498101" sldId="269"/>
+            <ac:spMk id="38" creationId="{00000000-0000-0000-0000-000000000000}"/>
+          </ac:spMkLst>
+        </pc:spChg>
+        <pc:spChg chg="del">
+          <ac:chgData name="Shannon Wong" userId="8c83f3d3550a5322" providerId="LiveId" clId="{9168E770-AE40-4547-B7F2-B274C2E98475}" dt="2020-04-04T03:53:20.797" v="2" actId="478"/>
+          <ac:spMkLst>
+            <pc:docMk/>
+            <pc:sldMk cId="3228498101" sldId="269"/>
+            <ac:spMk id="40" creationId="{00000000-0000-0000-0000-000000000000}"/>
+          </ac:spMkLst>
+        </pc:spChg>
+        <pc:spChg chg="del">
+          <ac:chgData name="Shannon Wong" userId="8c83f3d3550a5322" providerId="LiveId" clId="{9168E770-AE40-4547-B7F2-B274C2E98475}" dt="2020-04-04T03:53:19.260" v="1" actId="478"/>
+          <ac:spMkLst>
+            <pc:docMk/>
+            <pc:sldMk cId="3228498101" sldId="269"/>
+            <ac:spMk id="44" creationId="{1ABAE2EE-0C6F-40C9-9F83-C6E45146189B}"/>
+          </ac:spMkLst>
+        </pc:spChg>
+        <pc:spChg chg="mod">
+          <ac:chgData name="Shannon Wong" userId="8c83f3d3550a5322" providerId="LiveId" clId="{9168E770-AE40-4547-B7F2-B274C2E98475}" dt="2020-04-04T03:56:38.864" v="73" actId="14100"/>
+          <ac:spMkLst>
+            <pc:docMk/>
+            <pc:sldMk cId="3228498101" sldId="269"/>
+            <ac:spMk id="45" creationId="{0EB24DA8-2498-4853-AED4-3458A81C456A}"/>
+          </ac:spMkLst>
+        </pc:spChg>
+        <pc:spChg chg="mod">
+          <ac:chgData name="Shannon Wong" userId="8c83f3d3550a5322" providerId="LiveId" clId="{9168E770-AE40-4547-B7F2-B274C2E98475}" dt="2020-04-04T03:55:09.269" v="42" actId="1036"/>
+          <ac:spMkLst>
+            <pc:docMk/>
+            <pc:sldMk cId="3228498101" sldId="269"/>
+            <ac:spMk id="46" creationId="{9BC66A45-C94A-4E62-8981-39EC5DACDD6D}"/>
+          </ac:spMkLst>
+        </pc:spChg>
+        <pc:spChg chg="mod">
+          <ac:chgData name="Shannon Wong" userId="8c83f3d3550a5322" providerId="LiveId" clId="{9168E770-AE40-4547-B7F2-B274C2E98475}" dt="2020-04-04T03:54:22.148" v="35" actId="1076"/>
+          <ac:spMkLst>
+            <pc:docMk/>
+            <pc:sldMk cId="3228498101" sldId="269"/>
+            <ac:spMk id="47" creationId="{342B431E-151F-4A55-A1AE-57F6FE56D1EF}"/>
+          </ac:spMkLst>
+        </pc:spChg>
+        <pc:spChg chg="mod">
+          <ac:chgData name="Shannon Wong" userId="8c83f3d3550a5322" providerId="LiveId" clId="{9168E770-AE40-4547-B7F2-B274C2E98475}" dt="2020-04-04T03:54:09.889" v="31" actId="14100"/>
+          <ac:spMkLst>
+            <pc:docMk/>
+            <pc:sldMk cId="3228498101" sldId="269"/>
+            <ac:spMk id="48" creationId="{5278BFBC-6FA4-432C-994E-8DD2A55ED046}"/>
+          </ac:spMkLst>
+        </pc:spChg>
+        <pc:spChg chg="mod">
+          <ac:chgData name="Shannon Wong" userId="8c83f3d3550a5322" providerId="LiveId" clId="{9168E770-AE40-4547-B7F2-B274C2E98475}" dt="2020-04-04T03:56:24.696" v="70" actId="14100"/>
+          <ac:spMkLst>
+            <pc:docMk/>
+            <pc:sldMk cId="3228498101" sldId="269"/>
+            <ac:spMk id="52" creationId="{C30F3633-BE5D-441D-9C87-D00C0DFC3E6D}"/>
+          </ac:spMkLst>
+        </pc:spChg>
+        <pc:spChg chg="del">
+          <ac:chgData name="Shannon Wong" userId="8c83f3d3550a5322" providerId="LiveId" clId="{9168E770-AE40-4547-B7F2-B274C2E98475}" dt="2020-04-04T03:53:21.624" v="3" actId="478"/>
+          <ac:spMkLst>
+            <pc:docMk/>
+            <pc:sldMk cId="3228498101" sldId="269"/>
+            <ac:spMk id="53" creationId="{E7397DF1-A503-43B8-9D46-710440F45D61}"/>
+          </ac:spMkLst>
+        </pc:spChg>
+        <pc:cxnChg chg="mod">
+          <ac:chgData name="Shannon Wong" userId="8c83f3d3550a5322" providerId="LiveId" clId="{9168E770-AE40-4547-B7F2-B274C2E98475}" dt="2020-04-04T03:56:10.774" v="66" actId="1035"/>
+          <ac:cxnSpMkLst>
+            <pc:docMk/>
+            <pc:sldMk cId="3228498101" sldId="269"/>
+            <ac:cxnSpMk id="54" creationId="{BB6AEF2A-70C0-4C86-ACC0-ED4823D6AC46}"/>
+          </ac:cxnSpMkLst>
+        </pc:cxnChg>
+        <pc:cxnChg chg="mod">
+          <ac:chgData name="Shannon Wong" userId="8c83f3d3550a5322" providerId="LiveId" clId="{9168E770-AE40-4547-B7F2-B274C2E98475}" dt="2020-04-04T03:56:10.774" v="66" actId="1035"/>
+          <ac:cxnSpMkLst>
+            <pc:docMk/>
+            <pc:sldMk cId="3228498101" sldId="269"/>
+            <ac:cxnSpMk id="55" creationId="{9664B067-90B9-447F-947E-62F78A316229}"/>
+          </ac:cxnSpMkLst>
+        </pc:cxnChg>
+      </pc:sldChg>
+      <pc:sldChg chg="addSp delSp modSp delAnim modAnim">
+        <pc:chgData name="Shannon Wong" userId="8c83f3d3550a5322" providerId="LiveId" clId="{9168E770-AE40-4547-B7F2-B274C2E98475}" dt="2020-04-04T03:58:57.917" v="115" actId="14100"/>
+        <pc:sldMkLst>
+          <pc:docMk/>
+          <pc:sldMk cId="1666434637" sldId="270"/>
+        </pc:sldMkLst>
+        <pc:spChg chg="mod">
+          <ac:chgData name="Shannon Wong" userId="8c83f3d3550a5322" providerId="LiveId" clId="{9168E770-AE40-4547-B7F2-B274C2E98475}" dt="2020-04-04T03:58:52.952" v="114" actId="14100"/>
+          <ac:spMkLst>
+            <pc:docMk/>
+            <pc:sldMk cId="1666434637" sldId="270"/>
+            <ac:spMk id="5" creationId="{00000000-0000-0000-0000-000000000000}"/>
+          </ac:spMkLst>
+        </pc:spChg>
+        <pc:spChg chg="del">
+          <ac:chgData name="Shannon Wong" userId="8c83f3d3550a5322" providerId="LiveId" clId="{9168E770-AE40-4547-B7F2-B274C2E98475}" dt="2020-04-04T03:56:51.902" v="74" actId="478"/>
+          <ac:spMkLst>
+            <pc:docMk/>
+            <pc:sldMk cId="1666434637" sldId="270"/>
+            <ac:spMk id="17" creationId="{00000000-0000-0000-0000-000000000000}"/>
+          </ac:spMkLst>
+        </pc:spChg>
+        <pc:spChg chg="mod">
+          <ac:chgData name="Shannon Wong" userId="8c83f3d3550a5322" providerId="LiveId" clId="{9168E770-AE40-4547-B7F2-B274C2E98475}" dt="2020-04-04T03:57:39.795" v="89" actId="14100"/>
+          <ac:spMkLst>
+            <pc:docMk/>
+            <pc:sldMk cId="1666434637" sldId="270"/>
+            <ac:spMk id="19" creationId="{00000000-0000-0000-0000-000000000000}"/>
+          </ac:spMkLst>
+        </pc:spChg>
+        <pc:spChg chg="mod">
+          <ac:chgData name="Shannon Wong" userId="8c83f3d3550a5322" providerId="LiveId" clId="{9168E770-AE40-4547-B7F2-B274C2E98475}" dt="2020-04-04T03:57:12.145" v="80" actId="14100"/>
+          <ac:spMkLst>
+            <pc:docMk/>
+            <pc:sldMk cId="1666434637" sldId="270"/>
+            <ac:spMk id="20" creationId="{00000000-0000-0000-0000-000000000000}"/>
+          </ac:spMkLst>
+        </pc:spChg>
+        <pc:spChg chg="mod">
+          <ac:chgData name="Shannon Wong" userId="8c83f3d3550a5322" providerId="LiveId" clId="{9168E770-AE40-4547-B7F2-B274C2E98475}" dt="2020-04-04T03:57:59.047" v="94" actId="1076"/>
+          <ac:spMkLst>
+            <pc:docMk/>
+            <pc:sldMk cId="1666434637" sldId="270"/>
+            <ac:spMk id="21" creationId="{00000000-0000-0000-0000-000000000000}"/>
+          </ac:spMkLst>
+        </pc:spChg>
+        <pc:spChg chg="mod">
+          <ac:chgData name="Shannon Wong" userId="8c83f3d3550a5322" providerId="LiveId" clId="{9168E770-AE40-4547-B7F2-B274C2E98475}" dt="2020-04-04T03:57:35.277" v="88" actId="14100"/>
+          <ac:spMkLst>
+            <pc:docMk/>
+            <pc:sldMk cId="1666434637" sldId="270"/>
+            <ac:spMk id="24" creationId="{00000000-0000-0000-0000-000000000000}"/>
+          </ac:spMkLst>
+        </pc:spChg>
+        <pc:spChg chg="add mod">
+          <ac:chgData name="Shannon Wong" userId="8c83f3d3550a5322" providerId="LiveId" clId="{9168E770-AE40-4547-B7F2-B274C2E98475}" dt="2020-04-04T03:58:20.319" v="103" actId="14100"/>
+          <ac:spMkLst>
+            <pc:docMk/>
+            <pc:sldMk cId="1666434637" sldId="270"/>
+            <ac:spMk id="30" creationId="{D9E37555-32FA-44D3-93B4-9296CC13C1C8}"/>
+          </ac:spMkLst>
+        </pc:spChg>
+        <pc:spChg chg="add mod">
+          <ac:chgData name="Shannon Wong" userId="8c83f3d3550a5322" providerId="LiveId" clId="{9168E770-AE40-4547-B7F2-B274C2E98475}" dt="2020-04-04T03:58:37.552" v="109" actId="14100"/>
+          <ac:spMkLst>
+            <pc:docMk/>
+            <pc:sldMk cId="1666434637" sldId="270"/>
+            <ac:spMk id="31" creationId="{C40E02C0-7BCC-41D4-B83D-B5C19B7A727D}"/>
+          </ac:spMkLst>
+        </pc:spChg>
+        <pc:spChg chg="mod">
+          <ac:chgData name="Shannon Wong" userId="8c83f3d3550a5322" providerId="LiveId" clId="{9168E770-AE40-4547-B7F2-B274C2E98475}" dt="2020-04-04T03:58:57.917" v="115" actId="14100"/>
+          <ac:spMkLst>
+            <pc:docMk/>
+            <pc:sldMk cId="1666434637" sldId="270"/>
+            <ac:spMk id="33" creationId="{00000000-0000-0000-0000-000000000000}"/>
+          </ac:spMkLst>
+        </pc:spChg>
+        <pc:spChg chg="mod">
+          <ac:chgData name="Shannon Wong" userId="8c83f3d3550a5322" providerId="LiveId" clId="{9168E770-AE40-4547-B7F2-B274C2E98475}" dt="2020-04-04T03:57:19.633" v="83" actId="14100"/>
+          <ac:spMkLst>
+            <pc:docMk/>
+            <pc:sldMk cId="1666434637" sldId="270"/>
+            <ac:spMk id="34" creationId="{00000000-0000-0000-0000-000000000000}"/>
+          </ac:spMkLst>
+        </pc:spChg>
+        <pc:spChg chg="del">
+          <ac:chgData name="Shannon Wong" userId="8c83f3d3550a5322" providerId="LiveId" clId="{9168E770-AE40-4547-B7F2-B274C2E98475}" dt="2020-04-04T03:56:54.161" v="76" actId="478"/>
+          <ac:spMkLst>
+            <pc:docMk/>
+            <pc:sldMk cId="1666434637" sldId="270"/>
+            <ac:spMk id="40" creationId="{00000000-0000-0000-0000-000000000000}"/>
+          </ac:spMkLst>
+        </pc:spChg>
+        <pc:spChg chg="del">
+          <ac:chgData name="Shannon Wong" userId="8c83f3d3550a5322" providerId="LiveId" clId="{9168E770-AE40-4547-B7F2-B274C2E98475}" dt="2020-04-04T03:56:52.948" v="75" actId="478"/>
+          <ac:spMkLst>
+            <pc:docMk/>
+            <pc:sldMk cId="1666434637" sldId="270"/>
+            <ac:spMk id="44" creationId="{1ABAE2EE-0C6F-40C9-9F83-C6E45146189B}"/>
+          </ac:spMkLst>
+        </pc:spChg>
+        <pc:spChg chg="mod">
+          <ac:chgData name="Shannon Wong" userId="8c83f3d3550a5322" providerId="LiveId" clId="{9168E770-AE40-4547-B7F2-B274C2E98475}" dt="2020-04-04T03:57:51.706" v="92" actId="14100"/>
+          <ac:spMkLst>
+            <pc:docMk/>
+            <pc:sldMk cId="1666434637" sldId="270"/>
+            <ac:spMk id="45" creationId="{0EB24DA8-2498-4853-AED4-3458A81C456A}"/>
+          </ac:spMkLst>
+        </pc:spChg>
+        <pc:spChg chg="mod">
+          <ac:chgData name="Shannon Wong" userId="8c83f3d3550a5322" providerId="LiveId" clId="{9168E770-AE40-4547-B7F2-B274C2E98475}" dt="2020-04-04T03:58:05.165" v="97" actId="14100"/>
+          <ac:spMkLst>
+            <pc:docMk/>
+            <pc:sldMk cId="1666434637" sldId="270"/>
+            <ac:spMk id="46" creationId="{9BC66A45-C94A-4E62-8981-39EC5DACDD6D}"/>
+          </ac:spMkLst>
+        </pc:spChg>
+        <pc:spChg chg="mod">
+          <ac:chgData name="Shannon Wong" userId="8c83f3d3550a5322" providerId="LiveId" clId="{9168E770-AE40-4547-B7F2-B274C2E98475}" dt="2020-04-04T03:57:32.931" v="87" actId="1076"/>
+          <ac:spMkLst>
+            <pc:docMk/>
+            <pc:sldMk cId="1666434637" sldId="270"/>
+            <ac:spMk id="47" creationId="{342B431E-151F-4A55-A1AE-57F6FE56D1EF}"/>
+          </ac:spMkLst>
+        </pc:spChg>
+        <pc:spChg chg="mod">
+          <ac:chgData name="Shannon Wong" userId="8c83f3d3550a5322" providerId="LiveId" clId="{9168E770-AE40-4547-B7F2-B274C2E98475}" dt="2020-04-04T03:57:27.535" v="86" actId="14100"/>
+          <ac:spMkLst>
+            <pc:docMk/>
+            <pc:sldMk cId="1666434637" sldId="270"/>
+            <ac:spMk id="48" creationId="{5278BFBC-6FA4-432C-994E-8DD2A55ED046}"/>
+          </ac:spMkLst>
+        </pc:spChg>
+        <pc:spChg chg="mod">
+          <ac:chgData name="Shannon Wong" userId="8c83f3d3550a5322" providerId="LiveId" clId="{9168E770-AE40-4547-B7F2-B274C2E98475}" dt="2020-04-04T03:57:54.305" v="93" actId="1036"/>
+          <ac:spMkLst>
+            <pc:docMk/>
+            <pc:sldMk cId="1666434637" sldId="270"/>
+            <ac:spMk id="51" creationId="{34020A70-184B-4A57-816D-CCE686742C10}"/>
+          </ac:spMkLst>
+        </pc:spChg>
+        <pc:spChg chg="mod">
+          <ac:chgData name="Shannon Wong" userId="8c83f3d3550a5322" providerId="LiveId" clId="{9168E770-AE40-4547-B7F2-B274C2E98475}" dt="2020-04-04T03:58:45.890" v="112" actId="14100"/>
+          <ac:spMkLst>
+            <pc:docMk/>
+            <pc:sldMk cId="1666434637" sldId="270"/>
+            <ac:spMk id="52" creationId="{C30F3633-BE5D-441D-9C87-D00C0DFC3E6D}"/>
+          </ac:spMkLst>
+        </pc:spChg>
+        <pc:spChg chg="del">
+          <ac:chgData name="Shannon Wong" userId="8c83f3d3550a5322" providerId="LiveId" clId="{9168E770-AE40-4547-B7F2-B274C2E98475}" dt="2020-04-04T03:56:54.872" v="77" actId="478"/>
+          <ac:spMkLst>
+            <pc:docMk/>
+            <pc:sldMk cId="1666434637" sldId="270"/>
+            <ac:spMk id="53" creationId="{E7397DF1-A503-43B8-9D46-710440F45D61}"/>
           </ac:spMkLst>
         </pc:spChg>
       </pc:sldChg>
@@ -588,7 +923,7 @@
           <a:p>
             <a:fld id="{9629A0FB-7277-41B0-BEC2-EE35F8B0CE39}" type="datetimeFigureOut">
               <a:rPr lang="en-SG" smtClean="0"/>
-              <a:t>23/3/2020</a:t>
+              <a:t>4/4/2020</a:t>
             </a:fld>
             <a:endParaRPr lang="en-SG"/>
           </a:p>
@@ -4309,9 +4644,9 @@
           <p:nvPr/>
         </p:nvSpPr>
         <p:spPr bwMode="auto">
-          <a:xfrm>
-            <a:off x="728768" y="1440950"/>
-            <a:ext cx="10115" cy="3904336"/>
+          <a:xfrm flipH="1">
+            <a:off x="717064" y="1440949"/>
+            <a:ext cx="0" cy="4045425"/>
           </a:xfrm>
           <a:prstGeom prst="line">
             <a:avLst/>
@@ -4427,62 +4762,6 @@
       </p:sp>
       <p:sp>
         <p:nvSpPr>
-          <p:cNvPr id="17" name="Rectangle 16"/>
-          <p:cNvSpPr/>
-          <p:nvPr/>
-        </p:nvSpPr>
-        <p:spPr>
-          <a:xfrm>
-            <a:off x="603890" y="1721228"/>
-            <a:ext cx="225619" cy="3348432"/>
-          </a:xfrm>
-          <a:prstGeom prst="rect">
-            <a:avLst/>
-          </a:prstGeom>
-          <a:solidFill>
-            <a:schemeClr val="accent2">
-              <a:lumMod val="40000"/>
-              <a:lumOff val="60000"/>
-            </a:schemeClr>
-          </a:solidFill>
-          <a:ln>
-            <a:solidFill>
-              <a:schemeClr val="accent2">
-                <a:lumMod val="60000"/>
-                <a:lumOff val="40000"/>
-              </a:schemeClr>
-            </a:solidFill>
-          </a:ln>
-        </p:spPr>
-        <p:style>
-          <a:lnRef idx="2">
-            <a:schemeClr val="accent4"/>
-          </a:lnRef>
-          <a:fillRef idx="1">
-            <a:schemeClr val="lt1"/>
-          </a:fillRef>
-          <a:effectRef idx="0">
-            <a:schemeClr val="accent4"/>
-          </a:effectRef>
-          <a:fontRef idx="minor">
-            <a:schemeClr val="dk1"/>
-          </a:fontRef>
-        </p:style>
-        <p:txBody>
-          <a:bodyPr rtlCol="0" anchor="ctr"/>
-          <a:lstStyle/>
-          <a:p>
-            <a:pPr algn="ctr" defTabSz="872733"/>
-            <a:endParaRPr lang="en-US" sz="1500">
-              <a:solidFill>
-                <a:prstClr val="black"/>
-              </a:solidFill>
-            </a:endParaRPr>
-          </a:p>
-        </p:txBody>
-      </p:sp>
-      <p:sp>
-        <p:nvSpPr>
           <p:cNvPr id="18" name="Text Box 11"/>
           <p:cNvSpPr txBox="1">
             <a:spLocks noChangeArrowheads="1"/>
@@ -4564,7 +4843,7 @@
         <p:spPr bwMode="auto">
           <a:xfrm flipH="1">
             <a:off x="3018095" y="2137789"/>
-            <a:ext cx="8589" cy="1590924"/>
+            <a:ext cx="0" cy="1590924"/>
           </a:xfrm>
           <a:prstGeom prst="line">
             <a:avLst/>
@@ -4617,8 +4896,8 @@
         </p:nvSpPr>
         <p:spPr bwMode="auto">
           <a:xfrm flipV="1">
-            <a:off x="823868" y="1898263"/>
-            <a:ext cx="1747815" cy="12191"/>
+            <a:off x="728768" y="1898263"/>
+            <a:ext cx="1842916" cy="0"/>
           </a:xfrm>
           <a:prstGeom prst="line">
             <a:avLst/>
@@ -4703,9 +4982,9 @@
           <p:nvPr/>
         </p:nvSpPr>
         <p:spPr bwMode="auto">
-          <a:xfrm flipV="1">
-            <a:off x="3194466" y="3121220"/>
-            <a:ext cx="1871184" cy="18880"/>
+          <a:xfrm>
+            <a:off x="3018093" y="3101475"/>
+            <a:ext cx="2047557" cy="0"/>
           </a:xfrm>
           <a:prstGeom prst="line">
             <a:avLst/>
@@ -4850,8 +5129,8 @@
         </p:nvSpPr>
         <p:spPr bwMode="auto">
           <a:xfrm flipH="1">
-            <a:off x="5843365" y="3396473"/>
-            <a:ext cx="4560" cy="1893221"/>
+            <a:off x="5839337" y="3396474"/>
+            <a:ext cx="0" cy="1694798"/>
           </a:xfrm>
           <a:prstGeom prst="line">
             <a:avLst/>
@@ -4904,8 +5183,8 @@
         </p:nvSpPr>
         <p:spPr bwMode="auto">
           <a:xfrm flipV="1">
-            <a:off x="863760" y="2696243"/>
-            <a:ext cx="2040971" cy="1"/>
+            <a:off x="728767" y="2698103"/>
+            <a:ext cx="2297915" cy="0"/>
           </a:xfrm>
           <a:prstGeom prst="line">
             <a:avLst/>
@@ -4944,7 +5223,7 @@
         <p:spPr bwMode="auto">
           <a:xfrm>
             <a:off x="1211846" y="1581835"/>
-            <a:ext cx="1182981" cy="323165"/>
+            <a:ext cx="1182981" cy="288000"/>
           </a:xfrm>
           <a:prstGeom prst="rect">
             <a:avLst/>
@@ -4974,61 +5253,6 @@
               <a:rPr lang="en-US" sz="1500" i="1" dirty="0"/>
               <a:t>Parser()</a:t>
             </a:r>
-          </a:p>
-        </p:txBody>
-      </p:sp>
-      <p:sp>
-        <p:nvSpPr>
-          <p:cNvPr id="40" name="Rectangle 39"/>
-          <p:cNvSpPr/>
-          <p:nvPr/>
-        </p:nvSpPr>
-        <p:spPr>
-          <a:xfrm>
-            <a:off x="5717684" y="4066313"/>
-            <a:ext cx="251361" cy="878804"/>
-          </a:xfrm>
-          <a:prstGeom prst="rect">
-            <a:avLst/>
-          </a:prstGeom>
-          <a:solidFill>
-            <a:schemeClr val="accent3">
-              <a:lumMod val="20000"/>
-              <a:lumOff val="80000"/>
-            </a:schemeClr>
-          </a:solidFill>
-          <a:ln>
-            <a:solidFill>
-              <a:schemeClr val="accent3">
-                <a:lumMod val="75000"/>
-              </a:schemeClr>
-            </a:solidFill>
-          </a:ln>
-        </p:spPr>
-        <p:style>
-          <a:lnRef idx="2">
-            <a:schemeClr val="accent4"/>
-          </a:lnRef>
-          <a:fillRef idx="1">
-            <a:schemeClr val="lt1"/>
-          </a:fillRef>
-          <a:effectRef idx="0">
-            <a:schemeClr val="accent4"/>
-          </a:effectRef>
-          <a:fontRef idx="minor">
-            <a:schemeClr val="dk1"/>
-          </a:fontRef>
-        </p:style>
-        <p:txBody>
-          <a:bodyPr rtlCol="0" anchor="ctr"/>
-          <a:lstStyle/>
-          <a:p>
-            <a:pPr algn="ctr" defTabSz="872733"/>
-            <a:endParaRPr lang="en-US" sz="1500">
-              <a:solidFill>
-                <a:prstClr val="black"/>
-              </a:solidFill>
-            </a:endParaRPr>
           </a:p>
         </p:txBody>
       </p:sp>
@@ -5191,67 +5415,6 @@
       </p:sp>
       <p:sp>
         <p:nvSpPr>
-          <p:cNvPr id="44" name="Rectangle 43">
-            <a:extLst>
-              <a:ext uri="{FF2B5EF4-FFF2-40B4-BE49-F238E27FC236}">
-                <a16:creationId xmlns:a16="http://schemas.microsoft.com/office/drawing/2014/main" id="{1ABAE2EE-0C6F-40C9-9F83-C6E45146189B}"/>
-              </a:ext>
-            </a:extLst>
-          </p:cNvPr>
-          <p:cNvSpPr/>
-          <p:nvPr/>
-        </p:nvSpPr>
-        <p:spPr>
-          <a:xfrm>
-            <a:off x="2888219" y="2698465"/>
-            <a:ext cx="286905" cy="893938"/>
-          </a:xfrm>
-          <a:prstGeom prst="rect">
-            <a:avLst/>
-          </a:prstGeom>
-          <a:solidFill>
-            <a:schemeClr val="accent4">
-              <a:lumMod val="40000"/>
-              <a:lumOff val="60000"/>
-            </a:schemeClr>
-          </a:solidFill>
-          <a:ln>
-            <a:solidFill>
-              <a:schemeClr val="accent4">
-                <a:lumMod val="75000"/>
-              </a:schemeClr>
-            </a:solidFill>
-          </a:ln>
-        </p:spPr>
-        <p:style>
-          <a:lnRef idx="2">
-            <a:schemeClr val="accent4"/>
-          </a:lnRef>
-          <a:fillRef idx="1">
-            <a:schemeClr val="lt1"/>
-          </a:fillRef>
-          <a:effectRef idx="0">
-            <a:schemeClr val="accent4"/>
-          </a:effectRef>
-          <a:fontRef idx="minor">
-            <a:schemeClr val="dk1"/>
-          </a:fontRef>
-        </p:style>
-        <p:txBody>
-          <a:bodyPr rtlCol="0" anchor="ctr"/>
-          <a:lstStyle/>
-          <a:p>
-            <a:pPr algn="ctr" defTabSz="872733"/>
-            <a:endParaRPr lang="en-US" sz="1500">
-              <a:solidFill>
-                <a:prstClr val="black"/>
-              </a:solidFill>
-            </a:endParaRPr>
-          </a:p>
-        </p:txBody>
-      </p:sp>
-      <p:sp>
-        <p:nvSpPr>
           <p:cNvPr id="45" name="Line 15">
             <a:extLst>
               <a:ext uri="{FF2B5EF4-FFF2-40B4-BE49-F238E27FC236}">
@@ -5266,8 +5429,8 @@
         </p:nvSpPr>
         <p:spPr bwMode="auto">
           <a:xfrm>
-            <a:off x="875317" y="4066311"/>
-            <a:ext cx="4877422" cy="12839"/>
+            <a:off x="728766" y="4044402"/>
+            <a:ext cx="5114599" cy="0"/>
           </a:xfrm>
           <a:prstGeom prst="line">
             <a:avLst/>
@@ -5313,8 +5476,8 @@
         </p:nvSpPr>
         <p:spPr bwMode="auto">
           <a:xfrm>
-            <a:off x="5969045" y="4367567"/>
-            <a:ext cx="1970403" cy="11401"/>
+            <a:off x="5843365" y="4343400"/>
+            <a:ext cx="2227299" cy="0"/>
           </a:xfrm>
           <a:prstGeom prst="line">
             <a:avLst/>
@@ -5360,7 +5523,7 @@
         </p:nvSpPr>
         <p:spPr bwMode="auto">
           <a:xfrm>
-            <a:off x="3174259" y="2826789"/>
+            <a:off x="3063208" y="2728494"/>
             <a:ext cx="2084117" cy="323165"/>
           </a:xfrm>
           <a:prstGeom prst="rect">
@@ -5414,8 +5577,8 @@
         </p:nvSpPr>
         <p:spPr bwMode="auto">
           <a:xfrm flipH="1">
-            <a:off x="852246" y="3573169"/>
-            <a:ext cx="2016629" cy="7945"/>
+            <a:off x="728766" y="3559766"/>
+            <a:ext cx="2289327" cy="0"/>
           </a:xfrm>
           <a:prstGeom prst="line">
             <a:avLst/>
@@ -5596,8 +5759,8 @@
         </p:nvSpPr>
         <p:spPr bwMode="auto">
           <a:xfrm>
-            <a:off x="8070671" y="3740237"/>
-            <a:ext cx="0" cy="1605048"/>
+            <a:off x="8070670" y="3740236"/>
+            <a:ext cx="0" cy="1746159"/>
           </a:xfrm>
           <a:prstGeom prst="line">
             <a:avLst/>
@@ -5640,66 +5803,6 @@
           </a:p>
         </p:txBody>
       </p:sp>
-      <p:sp>
-        <p:nvSpPr>
-          <p:cNvPr id="53" name="Rectangle 52">
-            <a:extLst>
-              <a:ext uri="{FF2B5EF4-FFF2-40B4-BE49-F238E27FC236}">
-                <a16:creationId xmlns:a16="http://schemas.microsoft.com/office/drawing/2014/main" id="{E7397DF1-A503-43B8-9D46-710440F45D61}"/>
-              </a:ext>
-            </a:extLst>
-          </p:cNvPr>
-          <p:cNvSpPr/>
-          <p:nvPr/>
-        </p:nvSpPr>
-        <p:spPr>
-          <a:xfrm>
-            <a:off x="7944991" y="4367567"/>
-            <a:ext cx="251361" cy="697392"/>
-          </a:xfrm>
-          <a:prstGeom prst="rect">
-            <a:avLst/>
-          </a:prstGeom>
-          <a:solidFill>
-            <a:schemeClr val="bg2">
-              <a:lumMod val="75000"/>
-            </a:schemeClr>
-          </a:solidFill>
-          <a:ln>
-            <a:solidFill>
-              <a:schemeClr val="bg2">
-                <a:lumMod val="50000"/>
-              </a:schemeClr>
-            </a:solidFill>
-          </a:ln>
-        </p:spPr>
-        <p:style>
-          <a:lnRef idx="2">
-            <a:schemeClr val="accent4"/>
-          </a:lnRef>
-          <a:fillRef idx="1">
-            <a:schemeClr val="lt1"/>
-          </a:fillRef>
-          <a:effectRef idx="0">
-            <a:schemeClr val="accent4"/>
-          </a:effectRef>
-          <a:fontRef idx="minor">
-            <a:schemeClr val="dk1"/>
-          </a:fontRef>
-        </p:style>
-        <p:txBody>
-          <a:bodyPr rtlCol="0" anchor="ctr"/>
-          <a:lstStyle/>
-          <a:p>
-            <a:pPr algn="ctr" defTabSz="872733"/>
-            <a:endParaRPr lang="en-US" sz="1500">
-              <a:solidFill>
-                <a:prstClr val="black"/>
-              </a:solidFill>
-            </a:endParaRPr>
-          </a:p>
-        </p:txBody>
-      </p:sp>
       <p:cxnSp>
         <p:nvCxnSpPr>
           <p:cNvPr id="54" name="Straight Connector 53">
@@ -5714,7 +5817,7 @@
         </p:nvCxnSpPr>
         <p:spPr>
           <a:xfrm rot="16200000" flipV="1">
-            <a:off x="5698544" y="5196333"/>
+            <a:off x="5698544" y="4961388"/>
             <a:ext cx="284430" cy="267655"/>
           </a:xfrm>
           <a:prstGeom prst="line">
@@ -5757,7 +5860,7 @@
         </p:nvCxnSpPr>
         <p:spPr>
           <a:xfrm rot="5400000">
-            <a:off x="5691954" y="5200827"/>
+            <a:off x="5691954" y="4965882"/>
             <a:ext cx="288175" cy="266007"/>
           </a:xfrm>
           <a:prstGeom prst="line">
@@ -5786,6 +5889,102 @@
           </a:fontRef>
         </p:style>
       </p:cxnSp>
+      <p:sp>
+        <p:nvSpPr>
+          <p:cNvPr id="30" name="Line 15">
+            <a:extLst>
+              <a:ext uri="{FF2B5EF4-FFF2-40B4-BE49-F238E27FC236}">
+                <a16:creationId xmlns:a16="http://schemas.microsoft.com/office/drawing/2014/main" id="{D65DB86A-4CD0-4384-B33D-D4EABF59324B}"/>
+              </a:ext>
+            </a:extLst>
+          </p:cNvPr>
+          <p:cNvSpPr>
+            <a:spLocks noChangeShapeType="1"/>
+          </p:cNvSpPr>
+          <p:nvPr/>
+        </p:nvSpPr>
+        <p:spPr bwMode="auto">
+          <a:xfrm flipH="1" flipV="1">
+            <a:off x="728756" y="4857443"/>
+            <a:ext cx="5114598" cy="0"/>
+          </a:xfrm>
+          <a:prstGeom prst="line">
+            <a:avLst/>
+          </a:prstGeom>
+          <a:noFill/>
+          <a:ln w="19050">
+            <a:solidFill>
+              <a:schemeClr val="accent3">
+                <a:lumMod val="75000"/>
+              </a:schemeClr>
+            </a:solidFill>
+            <a:prstDash val="sysDash"/>
+            <a:round/>
+            <a:headEnd/>
+            <a:tailEnd type="triangle" w="lg" len="lg"/>
+          </a:ln>
+        </p:spPr>
+        <p:txBody>
+          <a:bodyPr/>
+          <a:lstStyle/>
+          <a:p>
+            <a:pPr defTabSz="872733"/>
+            <a:endParaRPr lang="en-US" sz="1500">
+              <a:solidFill>
+                <a:prstClr val="black"/>
+              </a:solidFill>
+            </a:endParaRPr>
+          </a:p>
+        </p:txBody>
+      </p:sp>
+      <p:sp>
+        <p:nvSpPr>
+          <p:cNvPr id="31" name="Line 15">
+            <a:extLst>
+              <a:ext uri="{FF2B5EF4-FFF2-40B4-BE49-F238E27FC236}">
+                <a16:creationId xmlns:a16="http://schemas.microsoft.com/office/drawing/2014/main" id="{B579E22B-3ECD-43D5-86CC-C70205A05EA8}"/>
+              </a:ext>
+            </a:extLst>
+          </p:cNvPr>
+          <p:cNvSpPr>
+            <a:spLocks noChangeShapeType="1"/>
+          </p:cNvSpPr>
+          <p:nvPr/>
+        </p:nvSpPr>
+        <p:spPr bwMode="auto">
+          <a:xfrm flipH="1">
+            <a:off x="5827587" y="4673901"/>
+            <a:ext cx="2243073" cy="0"/>
+          </a:xfrm>
+          <a:prstGeom prst="line">
+            <a:avLst/>
+          </a:prstGeom>
+          <a:noFill/>
+          <a:ln w="19050">
+            <a:solidFill>
+              <a:schemeClr val="bg2">
+                <a:lumMod val="50000"/>
+              </a:schemeClr>
+            </a:solidFill>
+            <a:prstDash val="sysDash"/>
+            <a:round/>
+            <a:headEnd/>
+            <a:tailEnd type="triangle" w="lg" len="lg"/>
+          </a:ln>
+        </p:spPr>
+        <p:txBody>
+          <a:bodyPr/>
+          <a:lstStyle/>
+          <a:p>
+            <a:pPr defTabSz="872733"/>
+            <a:endParaRPr lang="en-US" sz="1500">
+              <a:solidFill>
+                <a:prstClr val="black"/>
+              </a:solidFill>
+            </a:endParaRPr>
+          </a:p>
+        </p:txBody>
+      </p:sp>
     </p:spTree>
     <p:extLst>
       <p:ext uri="{BB962C8B-B14F-4D97-AF65-F5344CB8AC3E}">
@@ -5965,7 +6164,7 @@
                                           </p:stCondLst>
                                         </p:cTn>
                                         <p:tgtEl>
-                                          <p:spTgt spid="17"/>
+                                          <p:spTgt spid="18"/>
                                         </p:tgtEl>
                                         <p:attrNameLst>
                                           <p:attrName>style.visibility</p:attrName>
@@ -5992,7 +6191,7 @@
                                           </p:stCondLst>
                                         </p:cTn>
                                         <p:tgtEl>
-                                          <p:spTgt spid="18"/>
+                                          <p:spTgt spid="19"/>
                                         </p:tgtEl>
                                         <p:attrNameLst>
                                           <p:attrName>style.visibility</p:attrName>
@@ -6019,7 +6218,7 @@
                                           </p:stCondLst>
                                         </p:cTn>
                                         <p:tgtEl>
-                                          <p:spTgt spid="19"/>
+                                          <p:spTgt spid="20"/>
                                         </p:tgtEl>
                                         <p:attrNameLst>
                                           <p:attrName>style.visibility</p:attrName>
@@ -6046,7 +6245,7 @@
                                           </p:stCondLst>
                                         </p:cTn>
                                         <p:tgtEl>
-                                          <p:spTgt spid="20"/>
+                                          <p:spTgt spid="21"/>
                                         </p:tgtEl>
                                         <p:attrNameLst>
                                           <p:attrName>style.visibility</p:attrName>
@@ -6060,7 +6259,7 @@
                                 </p:cTn>
                               </p:par>
                               <p:par>
-                                <p:cTn id="23" presetID="1" presetClass="exit" presetSubtype="0" fill="hold" grpId="0" nodeType="withEffect">
+                                <p:cTn id="23" presetID="1" presetClass="exit" presetSubtype="0" fill="hold" grpId="1" nodeType="withEffect">
                                   <p:stCondLst>
                                     <p:cond delay="0"/>
                                   </p:stCondLst>
@@ -6073,7 +6272,7 @@
                                           </p:stCondLst>
                                         </p:cTn>
                                         <p:tgtEl>
-                                          <p:spTgt spid="21"/>
+                                          <p:spTgt spid="24"/>
                                         </p:tgtEl>
                                         <p:attrNameLst>
                                           <p:attrName>style.visibility</p:attrName>
@@ -6100,7 +6299,7 @@
                                           </p:stCondLst>
                                         </p:cTn>
                                         <p:tgtEl>
-                                          <p:spTgt spid="24"/>
+                                          <p:spTgt spid="25"/>
                                         </p:tgtEl>
                                         <p:attrNameLst>
                                           <p:attrName>style.visibility</p:attrName>
@@ -6127,7 +6326,7 @@
                                           </p:stCondLst>
                                         </p:cTn>
                                         <p:tgtEl>
-                                          <p:spTgt spid="25"/>
+                                          <p:spTgt spid="29"/>
                                         </p:tgtEl>
                                         <p:attrNameLst>
                                           <p:attrName>style.visibility</p:attrName>
@@ -6141,7 +6340,7 @@
                                 </p:cTn>
                               </p:par>
                               <p:par>
-                                <p:cTn id="29" presetID="1" presetClass="exit" presetSubtype="0" fill="hold" grpId="1" nodeType="withEffect">
+                                <p:cTn id="29" presetID="1" presetClass="exit" presetSubtype="0" fill="hold" grpId="0" nodeType="withEffect">
                                   <p:stCondLst>
                                     <p:cond delay="0"/>
                                   </p:stCondLst>
@@ -6154,7 +6353,7 @@
                                           </p:stCondLst>
                                         </p:cTn>
                                         <p:tgtEl>
-                                          <p:spTgt spid="29"/>
+                                          <p:spTgt spid="33"/>
                                         </p:tgtEl>
                                         <p:attrNameLst>
                                           <p:attrName>style.visibility</p:attrName>
@@ -6181,7 +6380,7 @@
                                           </p:stCondLst>
                                         </p:cTn>
                                         <p:tgtEl>
-                                          <p:spTgt spid="33"/>
+                                          <p:spTgt spid="34"/>
                                         </p:tgtEl>
                                         <p:attrNameLst>
                                           <p:attrName>style.visibility</p:attrName>
@@ -6208,7 +6407,7 @@
                                           </p:stCondLst>
                                         </p:cTn>
                                         <p:tgtEl>
-                                          <p:spTgt spid="34"/>
+                                          <p:spTgt spid="38"/>
                                         </p:tgtEl>
                                         <p:attrNameLst>
                                           <p:attrName>style.visibility</p:attrName>
@@ -6235,7 +6434,7 @@
                                           </p:stCondLst>
                                         </p:cTn>
                                         <p:tgtEl>
-                                          <p:spTgt spid="38"/>
+                                          <p:spTgt spid="42"/>
                                         </p:tgtEl>
                                         <p:attrNameLst>
                                           <p:attrName>style.visibility</p:attrName>
@@ -6262,60 +6461,6 @@
                                           </p:stCondLst>
                                         </p:cTn>
                                         <p:tgtEl>
-                                          <p:spTgt spid="40"/>
-                                        </p:tgtEl>
-                                        <p:attrNameLst>
-                                          <p:attrName>style.visibility</p:attrName>
-                                        </p:attrNameLst>
-                                      </p:cBhvr>
-                                      <p:to>
-                                        <p:strVal val="hidden"/>
-                                      </p:to>
-                                    </p:set>
-                                  </p:childTnLst>
-                                </p:cTn>
-                              </p:par>
-                              <p:par>
-                                <p:cTn id="39" presetID="1" presetClass="exit" presetSubtype="0" fill="hold" grpId="0" nodeType="withEffect">
-                                  <p:stCondLst>
-                                    <p:cond delay="0"/>
-                                  </p:stCondLst>
-                                  <p:childTnLst>
-                                    <p:set>
-                                      <p:cBhvr>
-                                        <p:cTn id="40" dur="1" fill="hold">
-                                          <p:stCondLst>
-                                            <p:cond delay="0"/>
-                                          </p:stCondLst>
-                                        </p:cTn>
-                                        <p:tgtEl>
-                                          <p:spTgt spid="42"/>
-                                        </p:tgtEl>
-                                        <p:attrNameLst>
-                                          <p:attrName>style.visibility</p:attrName>
-                                        </p:attrNameLst>
-                                      </p:cBhvr>
-                                      <p:to>
-                                        <p:strVal val="hidden"/>
-                                      </p:to>
-                                    </p:set>
-                                  </p:childTnLst>
-                                </p:cTn>
-                              </p:par>
-                              <p:par>
-                                <p:cTn id="41" presetID="1" presetClass="exit" presetSubtype="0" fill="hold" grpId="0" nodeType="withEffect">
-                                  <p:stCondLst>
-                                    <p:cond delay="0"/>
-                                  </p:stCondLst>
-                                  <p:childTnLst>
-                                    <p:set>
-                                      <p:cBhvr>
-                                        <p:cTn id="42" dur="1" fill="hold">
-                                          <p:stCondLst>
-                                            <p:cond delay="0"/>
-                                          </p:stCondLst>
-                                        </p:cTn>
-                                        <p:tgtEl>
                                           <p:spTgt spid="43"/>
                                         </p:tgtEl>
                                         <p:attrNameLst>
@@ -6329,8 +6474,53 @@
                                   </p:childTnLst>
                                 </p:cTn>
                               </p:par>
+                            </p:childTnLst>
+                          </p:cTn>
+                        </p:par>
+                      </p:childTnLst>
+                    </p:cTn>
+                  </p:par>
+                  <p:par>
+                    <p:cTn id="39" fill="hold">
+                      <p:stCondLst>
+                        <p:cond delay="indefinite"/>
+                      </p:stCondLst>
+                      <p:childTnLst>
+                        <p:par>
+                          <p:cTn id="40" fill="hold">
+                            <p:stCondLst>
+                              <p:cond delay="0"/>
+                            </p:stCondLst>
+                            <p:childTnLst>
                               <p:par>
-                                <p:cTn id="43" presetID="1" presetClass="exit" presetSubtype="0" fill="hold" grpId="0" nodeType="withEffect">
+                                <p:cTn id="41" presetID="1" presetClass="entr" presetSubtype="0" fill="hold" grpId="0" nodeType="clickEffect">
+                                  <p:stCondLst>
+                                    <p:cond delay="0"/>
+                                  </p:stCondLst>
+                                  <p:childTnLst>
+                                    <p:set>
+                                      <p:cBhvr>
+                                        <p:cTn id="42" dur="1" fill="hold">
+                                          <p:stCondLst>
+                                            <p:cond delay="0"/>
+                                          </p:stCondLst>
+                                        </p:cTn>
+                                        <p:tgtEl>
+                                          <p:spTgt spid="45"/>
+                                        </p:tgtEl>
+                                        <p:attrNameLst>
+                                          <p:attrName>style.visibility</p:attrName>
+                                        </p:attrNameLst>
+                                      </p:cBhvr>
+                                      <p:to>
+                                        <p:strVal val="visible"/>
+                                      </p:to>
+                                    </p:set>
+                                  </p:childTnLst>
+                                </p:cTn>
+                              </p:par>
+                              <p:par>
+                                <p:cTn id="43" presetID="1" presetClass="exit" presetSubtype="0" fill="hold" grpId="1" nodeType="withEffect">
                                   <p:stCondLst>
                                     <p:cond delay="0"/>
                                   </p:stCondLst>
@@ -6343,7 +6533,7 @@
                                           </p:stCondLst>
                                         </p:cTn>
                                         <p:tgtEl>
-                                          <p:spTgt spid="44"/>
+                                          <p:spTgt spid="45"/>
                                         </p:tgtEl>
                                         <p:attrNameLst>
                                           <p:attrName>style.visibility</p:attrName>
@@ -6388,7 +6578,7 @@
                                           </p:stCondLst>
                                         </p:cTn>
                                         <p:tgtEl>
-                                          <p:spTgt spid="45"/>
+                                          <p:spTgt spid="46"/>
                                         </p:tgtEl>
                                         <p:attrNameLst>
                                           <p:attrName>style.visibility</p:attrName>
@@ -6415,7 +6605,7 @@
                                           </p:stCondLst>
                                         </p:cTn>
                                         <p:tgtEl>
-                                          <p:spTgt spid="45"/>
+                                          <p:spTgt spid="46"/>
                                         </p:tgtEl>
                                         <p:attrNameLst>
                                           <p:attrName>style.visibility</p:attrName>
@@ -6428,39 +6618,21 @@
                                   </p:childTnLst>
                                 </p:cTn>
                               </p:par>
-                            </p:childTnLst>
-                          </p:cTn>
-                        </p:par>
-                      </p:childTnLst>
-                    </p:cTn>
-                  </p:par>
-                  <p:par>
-                    <p:cTn id="51" fill="hold">
-                      <p:stCondLst>
-                        <p:cond delay="indefinite"/>
-                      </p:stCondLst>
-                      <p:childTnLst>
-                        <p:par>
-                          <p:cTn id="52" fill="hold">
-                            <p:stCondLst>
-                              <p:cond delay="0"/>
-                            </p:stCondLst>
-                            <p:childTnLst>
                               <p:par>
-                                <p:cTn id="53" presetID="1" presetClass="entr" presetSubtype="0" fill="hold" grpId="0" nodeType="clickEffect">
+                                <p:cTn id="51" presetID="1" presetClass="entr" presetSubtype="0" fill="hold" grpId="0" nodeType="withEffect">
                                   <p:stCondLst>
                                     <p:cond delay="0"/>
                                   </p:stCondLst>
                                   <p:childTnLst>
                                     <p:set>
                                       <p:cBhvr>
-                                        <p:cTn id="54" dur="1" fill="hold">
+                                        <p:cTn id="52" dur="1" fill="hold">
                                           <p:stCondLst>
                                             <p:cond delay="0"/>
                                           </p:stCondLst>
                                         </p:cTn>
                                         <p:tgtEl>
-                                          <p:spTgt spid="46"/>
+                                          <p:spTgt spid="47"/>
                                         </p:tgtEl>
                                         <p:attrNameLst>
                                           <p:attrName>style.visibility</p:attrName>
@@ -6474,7 +6646,34 @@
                                 </p:cTn>
                               </p:par>
                               <p:par>
-                                <p:cTn id="55" presetID="1" presetClass="exit" presetSubtype="0" fill="hold" grpId="1" nodeType="withEffect">
+                                <p:cTn id="53" presetID="1" presetClass="exit" presetSubtype="0" fill="hold" grpId="1" nodeType="withEffect">
+                                  <p:stCondLst>
+                                    <p:cond delay="0"/>
+                                  </p:stCondLst>
+                                  <p:childTnLst>
+                                    <p:set>
+                                      <p:cBhvr>
+                                        <p:cTn id="54" dur="1" fill="hold">
+                                          <p:stCondLst>
+                                            <p:cond delay="0"/>
+                                          </p:stCondLst>
+                                        </p:cTn>
+                                        <p:tgtEl>
+                                          <p:spTgt spid="47"/>
+                                        </p:tgtEl>
+                                        <p:attrNameLst>
+                                          <p:attrName>style.visibility</p:attrName>
+                                        </p:attrNameLst>
+                                      </p:cBhvr>
+                                      <p:to>
+                                        <p:strVal val="hidden"/>
+                                      </p:to>
+                                    </p:set>
+                                  </p:childTnLst>
+                                </p:cTn>
+                              </p:par>
+                              <p:par>
+                                <p:cTn id="55" presetID="1" presetClass="exit" presetSubtype="0" fill="hold" grpId="0" nodeType="withEffect">
                                   <p:stCondLst>
                                     <p:cond delay="0"/>
                                   </p:stCondLst>
@@ -6487,7 +6686,7 @@
                                           </p:stCondLst>
                                         </p:cTn>
                                         <p:tgtEl>
-                                          <p:spTgt spid="46"/>
+                                          <p:spTgt spid="48"/>
                                         </p:tgtEl>
                                         <p:attrNameLst>
                                           <p:attrName>style.visibility</p:attrName>
@@ -6514,7 +6713,7 @@
                                           </p:stCondLst>
                                         </p:cTn>
                                         <p:tgtEl>
-                                          <p:spTgt spid="47"/>
+                                          <p:spTgt spid="51"/>
                                         </p:tgtEl>
                                         <p:attrNameLst>
                                           <p:attrName>style.visibility</p:attrName>
@@ -6541,7 +6740,7 @@
                                           </p:stCondLst>
                                         </p:cTn>
                                         <p:tgtEl>
-                                          <p:spTgt spid="47"/>
+                                          <p:spTgt spid="51"/>
                                         </p:tgtEl>
                                         <p:attrNameLst>
                                           <p:attrName>style.visibility</p:attrName>
@@ -6568,7 +6767,7 @@
                                           </p:stCondLst>
                                         </p:cTn>
                                         <p:tgtEl>
-                                          <p:spTgt spid="48"/>
+                                          <p:spTgt spid="52"/>
                                         </p:tgtEl>
                                         <p:attrNameLst>
                                           <p:attrName>style.visibility</p:attrName>
@@ -6581,21 +6780,39 @@
                                   </p:childTnLst>
                                 </p:cTn>
                               </p:par>
+                            </p:childTnLst>
+                          </p:cTn>
+                        </p:par>
+                      </p:childTnLst>
+                    </p:cTn>
+                  </p:par>
+                  <p:par>
+                    <p:cTn id="63" fill="hold">
+                      <p:stCondLst>
+                        <p:cond delay="indefinite"/>
+                      </p:stCondLst>
+                      <p:childTnLst>
+                        <p:par>
+                          <p:cTn id="64" fill="hold">
+                            <p:stCondLst>
+                              <p:cond delay="0"/>
+                            </p:stCondLst>
+                            <p:childTnLst>
                               <p:par>
-                                <p:cTn id="63" presetID="1" presetClass="entr" presetSubtype="0" fill="hold" grpId="0" nodeType="withEffect">
+                                <p:cTn id="65" presetID="1" presetClass="entr" presetSubtype="0" fill="hold" grpId="0" nodeType="clickEffect">
                                   <p:stCondLst>
                                     <p:cond delay="0"/>
                                   </p:stCondLst>
                                   <p:childTnLst>
                                     <p:set>
                                       <p:cBhvr>
-                                        <p:cTn id="64" dur="1" fill="hold">
+                                        <p:cTn id="66" dur="1" fill="hold">
                                           <p:stCondLst>
                                             <p:cond delay="0"/>
                                           </p:stCondLst>
                                         </p:cTn>
                                         <p:tgtEl>
-                                          <p:spTgt spid="51"/>
+                                          <p:spTgt spid="30"/>
                                         </p:tgtEl>
                                         <p:attrNameLst>
                                           <p:attrName>style.visibility</p:attrName>
@@ -6609,20 +6826,20 @@
                                 </p:cTn>
                               </p:par>
                               <p:par>
-                                <p:cTn id="65" presetID="1" presetClass="exit" presetSubtype="0" fill="hold" grpId="1" nodeType="withEffect">
+                                <p:cTn id="67" presetID="1" presetClass="exit" presetSubtype="0" fill="hold" grpId="1" nodeType="withEffect">
                                   <p:stCondLst>
                                     <p:cond delay="0"/>
                                   </p:stCondLst>
                                   <p:childTnLst>
                                     <p:set>
                                       <p:cBhvr>
-                                        <p:cTn id="66" dur="1" fill="hold">
+                                        <p:cTn id="68" dur="1" fill="hold">
                                           <p:stCondLst>
                                             <p:cond delay="0"/>
                                           </p:stCondLst>
                                         </p:cTn>
                                         <p:tgtEl>
-                                          <p:spTgt spid="51"/>
+                                          <p:spTgt spid="30"/>
                                         </p:tgtEl>
                                         <p:attrNameLst>
                                           <p:attrName>style.visibility</p:attrName>
@@ -6635,48 +6852,66 @@
                                   </p:childTnLst>
                                 </p:cTn>
                               </p:par>
+                            </p:childTnLst>
+                          </p:cTn>
+                        </p:par>
+                      </p:childTnLst>
+                    </p:cTn>
+                  </p:par>
+                  <p:par>
+                    <p:cTn id="69" fill="hold">
+                      <p:stCondLst>
+                        <p:cond delay="indefinite"/>
+                      </p:stCondLst>
+                      <p:childTnLst>
+                        <p:par>
+                          <p:cTn id="70" fill="hold">
+                            <p:stCondLst>
+                              <p:cond delay="0"/>
+                            </p:stCondLst>
+                            <p:childTnLst>
                               <p:par>
-                                <p:cTn id="67" presetID="1" presetClass="exit" presetSubtype="0" fill="hold" grpId="0" nodeType="withEffect">
+                                <p:cTn id="71" presetID="1" presetClass="entr" presetSubtype="0" fill="hold" grpId="0" nodeType="clickEffect">
                                   <p:stCondLst>
                                     <p:cond delay="0"/>
                                   </p:stCondLst>
                                   <p:childTnLst>
                                     <p:set>
                                       <p:cBhvr>
-                                        <p:cTn id="68" dur="1" fill="hold">
+                                        <p:cTn id="72" dur="1" fill="hold">
                                           <p:stCondLst>
                                             <p:cond delay="0"/>
                                           </p:stCondLst>
                                         </p:cTn>
                                         <p:tgtEl>
-                                          <p:spTgt spid="52"/>
+                                          <p:spTgt spid="31"/>
                                         </p:tgtEl>
                                         <p:attrNameLst>
                                           <p:attrName>style.visibility</p:attrName>
                                         </p:attrNameLst>
                                       </p:cBhvr>
                                       <p:to>
-                                        <p:strVal val="hidden"/>
+                                        <p:strVal val="visible"/>
                                       </p:to>
                                     </p:set>
                                   </p:childTnLst>
                                 </p:cTn>
                               </p:par>
                               <p:par>
-                                <p:cTn id="69" presetID="1" presetClass="exit" presetSubtype="0" fill="hold" grpId="0" nodeType="withEffect">
+                                <p:cTn id="73" presetID="1" presetClass="exit" presetSubtype="0" fill="hold" grpId="1" nodeType="withEffect">
                                   <p:stCondLst>
                                     <p:cond delay="0"/>
                                   </p:stCondLst>
                                   <p:childTnLst>
                                     <p:set>
                                       <p:cBhvr>
-                                        <p:cTn id="70" dur="1" fill="hold">
+                                        <p:cTn id="74" dur="1" fill="hold">
                                           <p:stCondLst>
                                             <p:cond delay="0"/>
                                           </p:stCondLst>
                                         </p:cTn>
                                         <p:tgtEl>
-                                          <p:spTgt spid="53"/>
+                                          <p:spTgt spid="31"/>
                                         </p:tgtEl>
                                         <p:attrNameLst>
                                           <p:attrName>style.visibility</p:attrName>
@@ -6719,7 +6954,6 @@
     <p:bldLst>
       <p:bldP spid="5" grpId="0" animBg="1"/>
       <p:bldP spid="6" grpId="0" animBg="1"/>
-      <p:bldP spid="17" grpId="0" animBg="1"/>
       <p:bldP spid="18" grpId="0" animBg="1"/>
       <p:bldP spid="19" grpId="0" animBg="1"/>
       <p:bldP spid="20" grpId="0" animBg="1"/>
@@ -6733,10 +6967,8 @@
       <p:bldP spid="33" grpId="0" animBg="1"/>
       <p:bldP spid="34" grpId="0" animBg="1"/>
       <p:bldP spid="38" grpId="0"/>
-      <p:bldP spid="40" grpId="0" animBg="1"/>
       <p:bldP spid="42" grpId="0" animBg="1"/>
       <p:bldP spid="43" grpId="0" animBg="1"/>
-      <p:bldP spid="44" grpId="0" animBg="1"/>
       <p:bldP spid="45" grpId="0" animBg="1"/>
       <p:bldP spid="45" grpId="1" animBg="1"/>
       <p:bldP spid="46" grpId="0" animBg="1"/>
@@ -6747,7 +6979,10 @@
       <p:bldP spid="51" grpId="0"/>
       <p:bldP spid="51" grpId="1"/>
       <p:bldP spid="52" grpId="0" animBg="1"/>
-      <p:bldP spid="53" grpId="0" animBg="1"/>
+      <p:bldP spid="30" grpId="0" animBg="1"/>
+      <p:bldP spid="30" grpId="1" animBg="1"/>
+      <p:bldP spid="31" grpId="0" animBg="1"/>
+      <p:bldP spid="31" grpId="1" animBg="1"/>
     </p:bldLst>
   </p:timing>
 </p:sld>
@@ -6779,9 +7014,9 @@
           <p:nvPr/>
         </p:nvSpPr>
         <p:spPr bwMode="auto">
-          <a:xfrm>
-            <a:off x="728768" y="1440950"/>
-            <a:ext cx="10115" cy="3904336"/>
+          <a:xfrm flipH="1">
+            <a:off x="721535" y="1440949"/>
+            <a:ext cx="0" cy="4121607"/>
           </a:xfrm>
           <a:prstGeom prst="line">
             <a:avLst/>
@@ -6897,62 +7132,6 @@
       </p:sp>
       <p:sp>
         <p:nvSpPr>
-          <p:cNvPr id="17" name="Rectangle 16"/>
-          <p:cNvSpPr/>
-          <p:nvPr/>
-        </p:nvSpPr>
-        <p:spPr>
-          <a:xfrm>
-            <a:off x="603890" y="1721228"/>
-            <a:ext cx="225619" cy="3348432"/>
-          </a:xfrm>
-          <a:prstGeom prst="rect">
-            <a:avLst/>
-          </a:prstGeom>
-          <a:solidFill>
-            <a:schemeClr val="accent2">
-              <a:lumMod val="40000"/>
-              <a:lumOff val="60000"/>
-            </a:schemeClr>
-          </a:solidFill>
-          <a:ln>
-            <a:solidFill>
-              <a:schemeClr val="accent2">
-                <a:lumMod val="60000"/>
-                <a:lumOff val="40000"/>
-              </a:schemeClr>
-            </a:solidFill>
-          </a:ln>
-        </p:spPr>
-        <p:style>
-          <a:lnRef idx="2">
-            <a:schemeClr val="accent4"/>
-          </a:lnRef>
-          <a:fillRef idx="1">
-            <a:schemeClr val="lt1"/>
-          </a:fillRef>
-          <a:effectRef idx="0">
-            <a:schemeClr val="accent4"/>
-          </a:effectRef>
-          <a:fontRef idx="minor">
-            <a:schemeClr val="dk1"/>
-          </a:fontRef>
-        </p:style>
-        <p:txBody>
-          <a:bodyPr rtlCol="0" anchor="ctr"/>
-          <a:lstStyle/>
-          <a:p>
-            <a:pPr algn="ctr" defTabSz="872733"/>
-            <a:endParaRPr lang="en-US" sz="1500">
-              <a:solidFill>
-                <a:prstClr val="black"/>
-              </a:solidFill>
-            </a:endParaRPr>
-          </a:p>
-        </p:txBody>
-      </p:sp>
-      <p:sp>
-        <p:nvSpPr>
           <p:cNvPr id="18" name="Text Box 11"/>
           <p:cNvSpPr txBox="1">
             <a:spLocks noChangeArrowheads="1"/>
@@ -7034,7 +7213,7 @@
         <p:spPr bwMode="auto">
           <a:xfrm flipH="1">
             <a:off x="3018095" y="2137789"/>
-            <a:ext cx="8589" cy="1590924"/>
+            <a:ext cx="0" cy="1590924"/>
           </a:xfrm>
           <a:prstGeom prst="line">
             <a:avLst/>
@@ -7087,8 +7266,8 @@
         </p:nvSpPr>
         <p:spPr bwMode="auto">
           <a:xfrm flipV="1">
-            <a:off x="823868" y="1898263"/>
-            <a:ext cx="1747815" cy="12191"/>
+            <a:off x="728768" y="1898262"/>
+            <a:ext cx="1842915" cy="0"/>
           </a:xfrm>
           <a:prstGeom prst="line">
             <a:avLst/>
@@ -7126,7 +7305,7 @@
         </p:nvSpPr>
         <p:spPr bwMode="auto">
           <a:xfrm>
-            <a:off x="6212959" y="4044402"/>
+            <a:off x="6207748" y="3977159"/>
             <a:ext cx="2062529" cy="323165"/>
           </a:xfrm>
           <a:prstGeom prst="rect">
@@ -7174,8 +7353,8 @@
         </p:nvSpPr>
         <p:spPr bwMode="auto">
           <a:xfrm flipV="1">
-            <a:off x="3194466" y="3109931"/>
-            <a:ext cx="2099784" cy="30169"/>
+            <a:off x="3018095" y="3109931"/>
+            <a:ext cx="2276155" cy="0"/>
           </a:xfrm>
           <a:prstGeom prst="line">
             <a:avLst/>
@@ -7321,7 +7500,7 @@
         <p:spPr bwMode="auto">
           <a:xfrm flipH="1">
             <a:off x="6071965" y="3396473"/>
-            <a:ext cx="4560" cy="1893221"/>
+            <a:ext cx="0" cy="1893221"/>
           </a:xfrm>
           <a:prstGeom prst="line">
             <a:avLst/>
@@ -7373,9 +7552,9 @@
           <p:nvPr/>
         </p:nvSpPr>
         <p:spPr bwMode="auto">
-          <a:xfrm flipV="1">
-            <a:off x="863760" y="2696243"/>
-            <a:ext cx="2040971" cy="1"/>
+          <a:xfrm>
+            <a:off x="750529" y="2711188"/>
+            <a:ext cx="2276151" cy="0"/>
           </a:xfrm>
           <a:prstGeom prst="line">
             <a:avLst/>
@@ -7444,61 +7623,6 @@
               <a:rPr lang="en-US" sz="1500" i="1" dirty="0"/>
               <a:t>Parser()</a:t>
             </a:r>
-          </a:p>
-        </p:txBody>
-      </p:sp>
-      <p:sp>
-        <p:nvSpPr>
-          <p:cNvPr id="40" name="Rectangle 39"/>
-          <p:cNvSpPr/>
-          <p:nvPr/>
-        </p:nvSpPr>
-        <p:spPr>
-          <a:xfrm>
-            <a:off x="5946284" y="4066313"/>
-            <a:ext cx="251361" cy="878804"/>
-          </a:xfrm>
-          <a:prstGeom prst="rect">
-            <a:avLst/>
-          </a:prstGeom>
-          <a:solidFill>
-            <a:schemeClr val="accent3">
-              <a:lumMod val="20000"/>
-              <a:lumOff val="80000"/>
-            </a:schemeClr>
-          </a:solidFill>
-          <a:ln>
-            <a:solidFill>
-              <a:schemeClr val="accent3">
-                <a:lumMod val="75000"/>
-              </a:schemeClr>
-            </a:solidFill>
-          </a:ln>
-        </p:spPr>
-        <p:style>
-          <a:lnRef idx="2">
-            <a:schemeClr val="accent4"/>
-          </a:lnRef>
-          <a:fillRef idx="1">
-            <a:schemeClr val="lt1"/>
-          </a:fillRef>
-          <a:effectRef idx="0">
-            <a:schemeClr val="accent4"/>
-          </a:effectRef>
-          <a:fontRef idx="minor">
-            <a:schemeClr val="dk1"/>
-          </a:fontRef>
-        </p:style>
-        <p:txBody>
-          <a:bodyPr rtlCol="0" anchor="ctr"/>
-          <a:lstStyle/>
-          <a:p>
-            <a:pPr algn="ctr" defTabSz="872733"/>
-            <a:endParaRPr lang="en-US" sz="1500">
-              <a:solidFill>
-                <a:prstClr val="black"/>
-              </a:solidFill>
-            </a:endParaRPr>
           </a:p>
         </p:txBody>
       </p:sp>
@@ -7661,67 +7785,6 @@
       </p:sp>
       <p:sp>
         <p:nvSpPr>
-          <p:cNvPr id="44" name="Rectangle 43">
-            <a:extLst>
-              <a:ext uri="{FF2B5EF4-FFF2-40B4-BE49-F238E27FC236}">
-                <a16:creationId xmlns:a16="http://schemas.microsoft.com/office/drawing/2014/main" id="{1ABAE2EE-0C6F-40C9-9F83-C6E45146189B}"/>
-              </a:ext>
-            </a:extLst>
-          </p:cNvPr>
-          <p:cNvSpPr/>
-          <p:nvPr/>
-        </p:nvSpPr>
-        <p:spPr>
-          <a:xfrm>
-            <a:off x="2888219" y="2698465"/>
-            <a:ext cx="286905" cy="893938"/>
-          </a:xfrm>
-          <a:prstGeom prst="rect">
-            <a:avLst/>
-          </a:prstGeom>
-          <a:solidFill>
-            <a:schemeClr val="accent4">
-              <a:lumMod val="40000"/>
-              <a:lumOff val="60000"/>
-            </a:schemeClr>
-          </a:solidFill>
-          <a:ln>
-            <a:solidFill>
-              <a:schemeClr val="accent4">
-                <a:lumMod val="75000"/>
-              </a:schemeClr>
-            </a:solidFill>
-          </a:ln>
-        </p:spPr>
-        <p:style>
-          <a:lnRef idx="2">
-            <a:schemeClr val="accent4"/>
-          </a:lnRef>
-          <a:fillRef idx="1">
-            <a:schemeClr val="lt1"/>
-          </a:fillRef>
-          <a:effectRef idx="0">
-            <a:schemeClr val="accent4"/>
-          </a:effectRef>
-          <a:fontRef idx="minor">
-            <a:schemeClr val="dk1"/>
-          </a:fontRef>
-        </p:style>
-        <p:txBody>
-          <a:bodyPr rtlCol="0" anchor="ctr"/>
-          <a:lstStyle/>
-          <a:p>
-            <a:pPr algn="ctr" defTabSz="872733"/>
-            <a:endParaRPr lang="en-US" sz="1500">
-              <a:solidFill>
-                <a:prstClr val="black"/>
-              </a:solidFill>
-            </a:endParaRPr>
-          </a:p>
-        </p:txBody>
-      </p:sp>
-      <p:sp>
-        <p:nvSpPr>
           <p:cNvPr id="45" name="Line 15">
             <a:extLst>
               <a:ext uri="{FF2B5EF4-FFF2-40B4-BE49-F238E27FC236}">
@@ -7735,9 +7798,9 @@
           <p:nvPr/>
         </p:nvSpPr>
         <p:spPr bwMode="auto">
-          <a:xfrm>
-            <a:off x="875317" y="4066312"/>
-            <a:ext cx="5033504" cy="14959"/>
+          <a:xfrm flipV="1">
+            <a:off x="744083" y="4103949"/>
+            <a:ext cx="5327882" cy="0"/>
           </a:xfrm>
           <a:prstGeom prst="line">
             <a:avLst/>
@@ -7783,8 +7846,8 @@
         </p:nvSpPr>
         <p:spPr bwMode="auto">
           <a:xfrm>
-            <a:off x="6197645" y="4367567"/>
-            <a:ext cx="1970403" cy="11401"/>
+            <a:off x="6071965" y="4378967"/>
+            <a:ext cx="2227302" cy="0"/>
           </a:xfrm>
           <a:prstGeom prst="line">
             <a:avLst/>
@@ -7830,7 +7893,7 @@
         </p:nvSpPr>
         <p:spPr bwMode="auto">
           <a:xfrm>
-            <a:off x="3174259" y="2826789"/>
+            <a:off x="3368789" y="2176440"/>
             <a:ext cx="2263876" cy="323165"/>
           </a:xfrm>
           <a:prstGeom prst="rect">
@@ -7884,8 +7947,8 @@
         </p:nvSpPr>
         <p:spPr bwMode="auto">
           <a:xfrm flipH="1">
-            <a:off x="852246" y="3573169"/>
-            <a:ext cx="2016629" cy="7945"/>
+            <a:off x="732770" y="3558210"/>
+            <a:ext cx="2293909" cy="0"/>
           </a:xfrm>
           <a:prstGeom prst="line">
             <a:avLst/>
@@ -8016,7 +8079,7 @@
         </p:nvSpPr>
         <p:spPr bwMode="auto">
           <a:xfrm>
-            <a:off x="3799306" y="3733800"/>
+            <a:off x="3799306" y="3791635"/>
             <a:ext cx="886908" cy="323165"/>
           </a:xfrm>
           <a:prstGeom prst="rect">
@@ -8066,8 +8129,8 @@
         </p:nvSpPr>
         <p:spPr bwMode="auto">
           <a:xfrm>
-            <a:off x="8299271" y="3740237"/>
-            <a:ext cx="0" cy="1605048"/>
+            <a:off x="8299271" y="3740236"/>
+            <a:ext cx="0" cy="1822341"/>
           </a:xfrm>
           <a:prstGeom prst="line">
             <a:avLst/>
@@ -8102,66 +8165,6 @@
           <a:lstStyle/>
           <a:p>
             <a:pPr defTabSz="872733"/>
-            <a:endParaRPr lang="en-US" sz="1500">
-              <a:solidFill>
-                <a:prstClr val="black"/>
-              </a:solidFill>
-            </a:endParaRPr>
-          </a:p>
-        </p:txBody>
-      </p:sp>
-      <p:sp>
-        <p:nvSpPr>
-          <p:cNvPr id="53" name="Rectangle 52">
-            <a:extLst>
-              <a:ext uri="{FF2B5EF4-FFF2-40B4-BE49-F238E27FC236}">
-                <a16:creationId xmlns:a16="http://schemas.microsoft.com/office/drawing/2014/main" id="{E7397DF1-A503-43B8-9D46-710440F45D61}"/>
-              </a:ext>
-            </a:extLst>
-          </p:cNvPr>
-          <p:cNvSpPr/>
-          <p:nvPr/>
-        </p:nvSpPr>
-        <p:spPr>
-          <a:xfrm>
-            <a:off x="8173591" y="4367567"/>
-            <a:ext cx="251361" cy="697392"/>
-          </a:xfrm>
-          <a:prstGeom prst="rect">
-            <a:avLst/>
-          </a:prstGeom>
-          <a:solidFill>
-            <a:schemeClr val="bg2">
-              <a:lumMod val="75000"/>
-            </a:schemeClr>
-          </a:solidFill>
-          <a:ln>
-            <a:solidFill>
-              <a:schemeClr val="bg2">
-                <a:lumMod val="50000"/>
-              </a:schemeClr>
-            </a:solidFill>
-          </a:ln>
-        </p:spPr>
-        <p:style>
-          <a:lnRef idx="2">
-            <a:schemeClr val="accent4"/>
-          </a:lnRef>
-          <a:fillRef idx="1">
-            <a:schemeClr val="lt1"/>
-          </a:fillRef>
-          <a:effectRef idx="0">
-            <a:schemeClr val="accent4"/>
-          </a:effectRef>
-          <a:fontRef idx="minor">
-            <a:schemeClr val="dk1"/>
-          </a:fontRef>
-        </p:style>
-        <p:txBody>
-          <a:bodyPr rtlCol="0" anchor="ctr"/>
-          <a:lstStyle/>
-          <a:p>
-            <a:pPr algn="ctr" defTabSz="872733"/>
             <a:endParaRPr lang="en-US" sz="1500">
               <a:solidFill>
                 <a:prstClr val="black"/>
@@ -8256,6 +8259,102 @@
           </a:fontRef>
         </p:style>
       </p:cxnSp>
+      <p:sp>
+        <p:nvSpPr>
+          <p:cNvPr id="30" name="Line 15">
+            <a:extLst>
+              <a:ext uri="{FF2B5EF4-FFF2-40B4-BE49-F238E27FC236}">
+                <a16:creationId xmlns:a16="http://schemas.microsoft.com/office/drawing/2014/main" id="{D9E37555-32FA-44D3-93B4-9296CC13C1C8}"/>
+              </a:ext>
+            </a:extLst>
+          </p:cNvPr>
+          <p:cNvSpPr>
+            <a:spLocks noChangeShapeType="1"/>
+          </p:cNvSpPr>
+          <p:nvPr/>
+        </p:nvSpPr>
+        <p:spPr bwMode="auto">
+          <a:xfrm flipH="1">
+            <a:off x="6071964" y="4742679"/>
+            <a:ext cx="2222740" cy="0"/>
+          </a:xfrm>
+          <a:prstGeom prst="line">
+            <a:avLst/>
+          </a:prstGeom>
+          <a:noFill/>
+          <a:ln w="19050">
+            <a:solidFill>
+              <a:schemeClr val="bg2">
+                <a:lumMod val="50000"/>
+              </a:schemeClr>
+            </a:solidFill>
+            <a:prstDash val="sysDash"/>
+            <a:round/>
+            <a:headEnd/>
+            <a:tailEnd type="triangle" w="lg" len="lg"/>
+          </a:ln>
+        </p:spPr>
+        <p:txBody>
+          <a:bodyPr/>
+          <a:lstStyle/>
+          <a:p>
+            <a:pPr defTabSz="872733"/>
+            <a:endParaRPr lang="en-US" sz="1500">
+              <a:solidFill>
+                <a:prstClr val="black"/>
+              </a:solidFill>
+            </a:endParaRPr>
+          </a:p>
+        </p:txBody>
+      </p:sp>
+      <p:sp>
+        <p:nvSpPr>
+          <p:cNvPr id="31" name="Line 15">
+            <a:extLst>
+              <a:ext uri="{FF2B5EF4-FFF2-40B4-BE49-F238E27FC236}">
+                <a16:creationId xmlns:a16="http://schemas.microsoft.com/office/drawing/2014/main" id="{C40E02C0-7BCC-41D4-B83D-B5C19B7A727D}"/>
+              </a:ext>
+            </a:extLst>
+          </p:cNvPr>
+          <p:cNvSpPr>
+            <a:spLocks noChangeShapeType="1"/>
+          </p:cNvSpPr>
+          <p:nvPr/>
+        </p:nvSpPr>
+        <p:spPr bwMode="auto">
+          <a:xfrm flipH="1">
+            <a:off x="744083" y="5005263"/>
+            <a:ext cx="5332442" cy="0"/>
+          </a:xfrm>
+          <a:prstGeom prst="line">
+            <a:avLst/>
+          </a:prstGeom>
+          <a:noFill/>
+          <a:ln w="19050">
+            <a:solidFill>
+              <a:schemeClr val="accent3">
+                <a:lumMod val="75000"/>
+              </a:schemeClr>
+            </a:solidFill>
+            <a:prstDash val="sysDash"/>
+            <a:round/>
+            <a:headEnd/>
+            <a:tailEnd type="triangle" w="lg" len="lg"/>
+          </a:ln>
+        </p:spPr>
+        <p:txBody>
+          <a:bodyPr/>
+          <a:lstStyle/>
+          <a:p>
+            <a:pPr defTabSz="872733"/>
+            <a:endParaRPr lang="en-US" sz="1500">
+              <a:solidFill>
+                <a:prstClr val="black"/>
+              </a:solidFill>
+            </a:endParaRPr>
+          </a:p>
+        </p:txBody>
+      </p:sp>
     </p:spTree>
     <p:extLst>
       <p:ext uri="{BB962C8B-B14F-4D97-AF65-F5344CB8AC3E}">
@@ -8435,7 +8534,7 @@
                                           </p:stCondLst>
                                         </p:cTn>
                                         <p:tgtEl>
-                                          <p:spTgt spid="17"/>
+                                          <p:spTgt spid="18"/>
                                         </p:tgtEl>
                                         <p:attrNameLst>
                                           <p:attrName>style.visibility</p:attrName>
@@ -8462,7 +8561,7 @@
                                           </p:stCondLst>
                                         </p:cTn>
                                         <p:tgtEl>
-                                          <p:spTgt spid="18"/>
+                                          <p:spTgt spid="19"/>
                                         </p:tgtEl>
                                         <p:attrNameLst>
                                           <p:attrName>style.visibility</p:attrName>
@@ -8489,7 +8588,7 @@
                                           </p:stCondLst>
                                         </p:cTn>
                                         <p:tgtEl>
-                                          <p:spTgt spid="19"/>
+                                          <p:spTgt spid="20"/>
                                         </p:tgtEl>
                                         <p:attrNameLst>
                                           <p:attrName>style.visibility</p:attrName>
@@ -8516,7 +8615,7 @@
                                           </p:stCondLst>
                                         </p:cTn>
                                         <p:tgtEl>
-                                          <p:spTgt spid="20"/>
+                                          <p:spTgt spid="21"/>
                                         </p:tgtEl>
                                         <p:attrNameLst>
                                           <p:attrName>style.visibility</p:attrName>
@@ -8530,7 +8629,7 @@
                                 </p:cTn>
                               </p:par>
                               <p:par>
-                                <p:cTn id="23" presetID="1" presetClass="exit" presetSubtype="0" fill="hold" grpId="0" nodeType="withEffect">
+                                <p:cTn id="23" presetID="1" presetClass="exit" presetSubtype="0" fill="hold" grpId="1" nodeType="withEffect">
                                   <p:stCondLst>
                                     <p:cond delay="0"/>
                                   </p:stCondLst>
@@ -8543,7 +8642,7 @@
                                           </p:stCondLst>
                                         </p:cTn>
                                         <p:tgtEl>
-                                          <p:spTgt spid="21"/>
+                                          <p:spTgt spid="24"/>
                                         </p:tgtEl>
                                         <p:attrNameLst>
                                           <p:attrName>style.visibility</p:attrName>
@@ -8570,7 +8669,7 @@
                                           </p:stCondLst>
                                         </p:cTn>
                                         <p:tgtEl>
-                                          <p:spTgt spid="24"/>
+                                          <p:spTgt spid="25"/>
                                         </p:tgtEl>
                                         <p:attrNameLst>
                                           <p:attrName>style.visibility</p:attrName>
@@ -8597,7 +8696,7 @@
                                           </p:stCondLst>
                                         </p:cTn>
                                         <p:tgtEl>
-                                          <p:spTgt spid="25"/>
+                                          <p:spTgt spid="29"/>
                                         </p:tgtEl>
                                         <p:attrNameLst>
                                           <p:attrName>style.visibility</p:attrName>
@@ -8611,7 +8710,7 @@
                                 </p:cTn>
                               </p:par>
                               <p:par>
-                                <p:cTn id="29" presetID="1" presetClass="exit" presetSubtype="0" fill="hold" grpId="1" nodeType="withEffect">
+                                <p:cTn id="29" presetID="1" presetClass="exit" presetSubtype="0" fill="hold" grpId="0" nodeType="withEffect">
                                   <p:stCondLst>
                                     <p:cond delay="0"/>
                                   </p:stCondLst>
@@ -8624,7 +8723,7 @@
                                           </p:stCondLst>
                                         </p:cTn>
                                         <p:tgtEl>
-                                          <p:spTgt spid="29"/>
+                                          <p:spTgt spid="33"/>
                                         </p:tgtEl>
                                         <p:attrNameLst>
                                           <p:attrName>style.visibility</p:attrName>
@@ -8651,7 +8750,7 @@
                                           </p:stCondLst>
                                         </p:cTn>
                                         <p:tgtEl>
-                                          <p:spTgt spid="33"/>
+                                          <p:spTgt spid="34"/>
                                         </p:tgtEl>
                                         <p:attrNameLst>
                                           <p:attrName>style.visibility</p:attrName>
@@ -8678,7 +8777,7 @@
                                           </p:stCondLst>
                                         </p:cTn>
                                         <p:tgtEl>
-                                          <p:spTgt spid="34"/>
+                                          <p:spTgt spid="38"/>
                                         </p:tgtEl>
                                         <p:attrNameLst>
                                           <p:attrName>style.visibility</p:attrName>
@@ -8705,7 +8804,7 @@
                                           </p:stCondLst>
                                         </p:cTn>
                                         <p:tgtEl>
-                                          <p:spTgt spid="38"/>
+                                          <p:spTgt spid="42"/>
                                         </p:tgtEl>
                                         <p:attrNameLst>
                                           <p:attrName>style.visibility</p:attrName>
@@ -8732,60 +8831,6 @@
                                           </p:stCondLst>
                                         </p:cTn>
                                         <p:tgtEl>
-                                          <p:spTgt spid="40"/>
-                                        </p:tgtEl>
-                                        <p:attrNameLst>
-                                          <p:attrName>style.visibility</p:attrName>
-                                        </p:attrNameLst>
-                                      </p:cBhvr>
-                                      <p:to>
-                                        <p:strVal val="hidden"/>
-                                      </p:to>
-                                    </p:set>
-                                  </p:childTnLst>
-                                </p:cTn>
-                              </p:par>
-                              <p:par>
-                                <p:cTn id="39" presetID="1" presetClass="exit" presetSubtype="0" fill="hold" grpId="0" nodeType="withEffect">
-                                  <p:stCondLst>
-                                    <p:cond delay="0"/>
-                                  </p:stCondLst>
-                                  <p:childTnLst>
-                                    <p:set>
-                                      <p:cBhvr>
-                                        <p:cTn id="40" dur="1" fill="hold">
-                                          <p:stCondLst>
-                                            <p:cond delay="0"/>
-                                          </p:stCondLst>
-                                        </p:cTn>
-                                        <p:tgtEl>
-                                          <p:spTgt spid="42"/>
-                                        </p:tgtEl>
-                                        <p:attrNameLst>
-                                          <p:attrName>style.visibility</p:attrName>
-                                        </p:attrNameLst>
-                                      </p:cBhvr>
-                                      <p:to>
-                                        <p:strVal val="hidden"/>
-                                      </p:to>
-                                    </p:set>
-                                  </p:childTnLst>
-                                </p:cTn>
-                              </p:par>
-                              <p:par>
-                                <p:cTn id="41" presetID="1" presetClass="exit" presetSubtype="0" fill="hold" grpId="0" nodeType="withEffect">
-                                  <p:stCondLst>
-                                    <p:cond delay="0"/>
-                                  </p:stCondLst>
-                                  <p:childTnLst>
-                                    <p:set>
-                                      <p:cBhvr>
-                                        <p:cTn id="42" dur="1" fill="hold">
-                                          <p:stCondLst>
-                                            <p:cond delay="0"/>
-                                          </p:stCondLst>
-                                        </p:cTn>
-                                        <p:tgtEl>
                                           <p:spTgt spid="43"/>
                                         </p:tgtEl>
                                         <p:attrNameLst>
@@ -8799,8 +8844,53 @@
                                   </p:childTnLst>
                                 </p:cTn>
                               </p:par>
+                            </p:childTnLst>
+                          </p:cTn>
+                        </p:par>
+                      </p:childTnLst>
+                    </p:cTn>
+                  </p:par>
+                  <p:par>
+                    <p:cTn id="39" fill="hold">
+                      <p:stCondLst>
+                        <p:cond delay="indefinite"/>
+                      </p:stCondLst>
+                      <p:childTnLst>
+                        <p:par>
+                          <p:cTn id="40" fill="hold">
+                            <p:stCondLst>
+                              <p:cond delay="0"/>
+                            </p:stCondLst>
+                            <p:childTnLst>
                               <p:par>
-                                <p:cTn id="43" presetID="1" presetClass="exit" presetSubtype="0" fill="hold" grpId="0" nodeType="withEffect">
+                                <p:cTn id="41" presetID="1" presetClass="entr" presetSubtype="0" fill="hold" grpId="0" nodeType="clickEffect">
+                                  <p:stCondLst>
+                                    <p:cond delay="0"/>
+                                  </p:stCondLst>
+                                  <p:childTnLst>
+                                    <p:set>
+                                      <p:cBhvr>
+                                        <p:cTn id="42" dur="1" fill="hold">
+                                          <p:stCondLst>
+                                            <p:cond delay="0"/>
+                                          </p:stCondLst>
+                                        </p:cTn>
+                                        <p:tgtEl>
+                                          <p:spTgt spid="45"/>
+                                        </p:tgtEl>
+                                        <p:attrNameLst>
+                                          <p:attrName>style.visibility</p:attrName>
+                                        </p:attrNameLst>
+                                      </p:cBhvr>
+                                      <p:to>
+                                        <p:strVal val="visible"/>
+                                      </p:to>
+                                    </p:set>
+                                  </p:childTnLst>
+                                </p:cTn>
+                              </p:par>
+                              <p:par>
+                                <p:cTn id="43" presetID="1" presetClass="exit" presetSubtype="0" fill="hold" grpId="1" nodeType="withEffect">
                                   <p:stCondLst>
                                     <p:cond delay="0"/>
                                   </p:stCondLst>
@@ -8813,7 +8903,7 @@
                                           </p:stCondLst>
                                         </p:cTn>
                                         <p:tgtEl>
-                                          <p:spTgt spid="44"/>
+                                          <p:spTgt spid="45"/>
                                         </p:tgtEl>
                                         <p:attrNameLst>
                                           <p:attrName>style.visibility</p:attrName>
@@ -8858,7 +8948,7 @@
                                           </p:stCondLst>
                                         </p:cTn>
                                         <p:tgtEl>
-                                          <p:spTgt spid="45"/>
+                                          <p:spTgt spid="46"/>
                                         </p:tgtEl>
                                         <p:attrNameLst>
                                           <p:attrName>style.visibility</p:attrName>
@@ -8885,7 +8975,7 @@
                                           </p:stCondLst>
                                         </p:cTn>
                                         <p:tgtEl>
-                                          <p:spTgt spid="45"/>
+                                          <p:spTgt spid="46"/>
                                         </p:tgtEl>
                                         <p:attrNameLst>
                                           <p:attrName>style.visibility</p:attrName>
@@ -8898,39 +8988,21 @@
                                   </p:childTnLst>
                                 </p:cTn>
                               </p:par>
-                            </p:childTnLst>
-                          </p:cTn>
-                        </p:par>
-                      </p:childTnLst>
-                    </p:cTn>
-                  </p:par>
-                  <p:par>
-                    <p:cTn id="51" fill="hold">
-                      <p:stCondLst>
-                        <p:cond delay="indefinite"/>
-                      </p:stCondLst>
-                      <p:childTnLst>
-                        <p:par>
-                          <p:cTn id="52" fill="hold">
-                            <p:stCondLst>
-                              <p:cond delay="0"/>
-                            </p:stCondLst>
-                            <p:childTnLst>
                               <p:par>
-                                <p:cTn id="53" presetID="1" presetClass="entr" presetSubtype="0" fill="hold" grpId="0" nodeType="clickEffect">
+                                <p:cTn id="51" presetID="1" presetClass="entr" presetSubtype="0" fill="hold" grpId="0" nodeType="withEffect">
                                   <p:stCondLst>
                                     <p:cond delay="0"/>
                                   </p:stCondLst>
                                   <p:childTnLst>
                                     <p:set>
                                       <p:cBhvr>
-                                        <p:cTn id="54" dur="1" fill="hold">
+                                        <p:cTn id="52" dur="1" fill="hold">
                                           <p:stCondLst>
                                             <p:cond delay="0"/>
                                           </p:stCondLst>
                                         </p:cTn>
                                         <p:tgtEl>
-                                          <p:spTgt spid="46"/>
+                                          <p:spTgt spid="47"/>
                                         </p:tgtEl>
                                         <p:attrNameLst>
                                           <p:attrName>style.visibility</p:attrName>
@@ -8944,7 +9016,34 @@
                                 </p:cTn>
                               </p:par>
                               <p:par>
-                                <p:cTn id="55" presetID="1" presetClass="exit" presetSubtype="0" fill="hold" grpId="1" nodeType="withEffect">
+                                <p:cTn id="53" presetID="1" presetClass="exit" presetSubtype="0" fill="hold" grpId="1" nodeType="withEffect">
+                                  <p:stCondLst>
+                                    <p:cond delay="0"/>
+                                  </p:stCondLst>
+                                  <p:childTnLst>
+                                    <p:set>
+                                      <p:cBhvr>
+                                        <p:cTn id="54" dur="1" fill="hold">
+                                          <p:stCondLst>
+                                            <p:cond delay="0"/>
+                                          </p:stCondLst>
+                                        </p:cTn>
+                                        <p:tgtEl>
+                                          <p:spTgt spid="47"/>
+                                        </p:tgtEl>
+                                        <p:attrNameLst>
+                                          <p:attrName>style.visibility</p:attrName>
+                                        </p:attrNameLst>
+                                      </p:cBhvr>
+                                      <p:to>
+                                        <p:strVal val="hidden"/>
+                                      </p:to>
+                                    </p:set>
+                                  </p:childTnLst>
+                                </p:cTn>
+                              </p:par>
+                              <p:par>
+                                <p:cTn id="55" presetID="1" presetClass="exit" presetSubtype="0" fill="hold" grpId="0" nodeType="withEffect">
                                   <p:stCondLst>
                                     <p:cond delay="0"/>
                                   </p:stCondLst>
@@ -8957,7 +9056,7 @@
                                           </p:stCondLst>
                                         </p:cTn>
                                         <p:tgtEl>
-                                          <p:spTgt spid="46"/>
+                                          <p:spTgt spid="48"/>
                                         </p:tgtEl>
                                         <p:attrNameLst>
                                           <p:attrName>style.visibility</p:attrName>
@@ -8984,7 +9083,7 @@
                                           </p:stCondLst>
                                         </p:cTn>
                                         <p:tgtEl>
-                                          <p:spTgt spid="47"/>
+                                          <p:spTgt spid="51"/>
                                         </p:tgtEl>
                                         <p:attrNameLst>
                                           <p:attrName>style.visibility</p:attrName>
@@ -9011,7 +9110,7 @@
                                           </p:stCondLst>
                                         </p:cTn>
                                         <p:tgtEl>
-                                          <p:spTgt spid="47"/>
+                                          <p:spTgt spid="51"/>
                                         </p:tgtEl>
                                         <p:attrNameLst>
                                           <p:attrName>style.visibility</p:attrName>
@@ -9038,7 +9137,7 @@
                                           </p:stCondLst>
                                         </p:cTn>
                                         <p:tgtEl>
-                                          <p:spTgt spid="48"/>
+                                          <p:spTgt spid="52"/>
                                         </p:tgtEl>
                                         <p:attrNameLst>
                                           <p:attrName>style.visibility</p:attrName>
@@ -9051,21 +9150,39 @@
                                   </p:childTnLst>
                                 </p:cTn>
                               </p:par>
+                            </p:childTnLst>
+                          </p:cTn>
+                        </p:par>
+                      </p:childTnLst>
+                    </p:cTn>
+                  </p:par>
+                  <p:par>
+                    <p:cTn id="63" fill="hold">
+                      <p:stCondLst>
+                        <p:cond delay="indefinite"/>
+                      </p:stCondLst>
+                      <p:childTnLst>
+                        <p:par>
+                          <p:cTn id="64" fill="hold">
+                            <p:stCondLst>
+                              <p:cond delay="0"/>
+                            </p:stCondLst>
+                            <p:childTnLst>
                               <p:par>
-                                <p:cTn id="63" presetID="1" presetClass="entr" presetSubtype="0" fill="hold" grpId="0" nodeType="withEffect">
+                                <p:cTn id="65" presetID="1" presetClass="entr" presetSubtype="0" fill="hold" grpId="0" nodeType="clickEffect">
                                   <p:stCondLst>
                                     <p:cond delay="0"/>
                                   </p:stCondLst>
                                   <p:childTnLst>
                                     <p:set>
                                       <p:cBhvr>
-                                        <p:cTn id="64" dur="1" fill="hold">
+                                        <p:cTn id="66" dur="1" fill="hold">
                                           <p:stCondLst>
                                             <p:cond delay="0"/>
                                           </p:stCondLst>
                                         </p:cTn>
                                         <p:tgtEl>
-                                          <p:spTgt spid="51"/>
+                                          <p:spTgt spid="30"/>
                                         </p:tgtEl>
                                         <p:attrNameLst>
                                           <p:attrName>style.visibility</p:attrName>
@@ -9079,20 +9196,20 @@
                                 </p:cTn>
                               </p:par>
                               <p:par>
-                                <p:cTn id="65" presetID="1" presetClass="exit" presetSubtype="0" fill="hold" grpId="1" nodeType="withEffect">
+                                <p:cTn id="67" presetID="1" presetClass="exit" presetSubtype="0" fill="hold" grpId="1" nodeType="withEffect">
                                   <p:stCondLst>
                                     <p:cond delay="0"/>
                                   </p:stCondLst>
                                   <p:childTnLst>
                                     <p:set>
                                       <p:cBhvr>
-                                        <p:cTn id="66" dur="1" fill="hold">
+                                        <p:cTn id="68" dur="1" fill="hold">
                                           <p:stCondLst>
                                             <p:cond delay="0"/>
                                           </p:stCondLst>
                                         </p:cTn>
                                         <p:tgtEl>
-                                          <p:spTgt spid="51"/>
+                                          <p:spTgt spid="30"/>
                                         </p:tgtEl>
                                         <p:attrNameLst>
                                           <p:attrName>style.visibility</p:attrName>
@@ -9105,48 +9222,66 @@
                                   </p:childTnLst>
                                 </p:cTn>
                               </p:par>
+                            </p:childTnLst>
+                          </p:cTn>
+                        </p:par>
+                      </p:childTnLst>
+                    </p:cTn>
+                  </p:par>
+                  <p:par>
+                    <p:cTn id="69" fill="hold">
+                      <p:stCondLst>
+                        <p:cond delay="indefinite"/>
+                      </p:stCondLst>
+                      <p:childTnLst>
+                        <p:par>
+                          <p:cTn id="70" fill="hold">
+                            <p:stCondLst>
+                              <p:cond delay="0"/>
+                            </p:stCondLst>
+                            <p:childTnLst>
                               <p:par>
-                                <p:cTn id="67" presetID="1" presetClass="exit" presetSubtype="0" fill="hold" grpId="0" nodeType="withEffect">
+                                <p:cTn id="71" presetID="1" presetClass="entr" presetSubtype="0" fill="hold" grpId="0" nodeType="clickEffect">
                                   <p:stCondLst>
                                     <p:cond delay="0"/>
                                   </p:stCondLst>
                                   <p:childTnLst>
                                     <p:set>
                                       <p:cBhvr>
-                                        <p:cTn id="68" dur="1" fill="hold">
+                                        <p:cTn id="72" dur="1" fill="hold">
                                           <p:stCondLst>
                                             <p:cond delay="0"/>
                                           </p:stCondLst>
                                         </p:cTn>
                                         <p:tgtEl>
-                                          <p:spTgt spid="52"/>
+                                          <p:spTgt spid="31"/>
                                         </p:tgtEl>
                                         <p:attrNameLst>
                                           <p:attrName>style.visibility</p:attrName>
                                         </p:attrNameLst>
                                       </p:cBhvr>
                                       <p:to>
-                                        <p:strVal val="hidden"/>
+                                        <p:strVal val="visible"/>
                                       </p:to>
                                     </p:set>
                                   </p:childTnLst>
                                 </p:cTn>
                               </p:par>
                               <p:par>
-                                <p:cTn id="69" presetID="1" presetClass="exit" presetSubtype="0" fill="hold" grpId="0" nodeType="withEffect">
+                                <p:cTn id="73" presetID="1" presetClass="exit" presetSubtype="0" fill="hold" grpId="1" nodeType="withEffect">
                                   <p:stCondLst>
                                     <p:cond delay="0"/>
                                   </p:stCondLst>
                                   <p:childTnLst>
                                     <p:set>
                                       <p:cBhvr>
-                                        <p:cTn id="70" dur="1" fill="hold">
+                                        <p:cTn id="74" dur="1" fill="hold">
                                           <p:stCondLst>
                                             <p:cond delay="0"/>
                                           </p:stCondLst>
                                         </p:cTn>
                                         <p:tgtEl>
-                                          <p:spTgt spid="53"/>
+                                          <p:spTgt spid="31"/>
                                         </p:tgtEl>
                                         <p:attrNameLst>
                                           <p:attrName>style.visibility</p:attrName>
@@ -9189,7 +9324,6 @@
     <p:bldLst>
       <p:bldP spid="5" grpId="0" animBg="1"/>
       <p:bldP spid="6" grpId="0" animBg="1"/>
-      <p:bldP spid="17" grpId="0" animBg="1"/>
       <p:bldP spid="18" grpId="0" animBg="1"/>
       <p:bldP spid="19" grpId="0" animBg="1"/>
       <p:bldP spid="20" grpId="0" animBg="1"/>
@@ -9203,10 +9337,8 @@
       <p:bldP spid="33" grpId="0" animBg="1"/>
       <p:bldP spid="34" grpId="0" animBg="1"/>
       <p:bldP spid="38" grpId="0"/>
-      <p:bldP spid="40" grpId="0" animBg="1"/>
       <p:bldP spid="42" grpId="0" animBg="1"/>
       <p:bldP spid="43" grpId="0" animBg="1"/>
-      <p:bldP spid="44" grpId="0" animBg="1"/>
       <p:bldP spid="45" grpId="0" animBg="1"/>
       <p:bldP spid="45" grpId="1" animBg="1"/>
       <p:bldP spid="46" grpId="0" animBg="1"/>
@@ -9217,7 +9349,10 @@
       <p:bldP spid="51" grpId="0"/>
       <p:bldP spid="51" grpId="1"/>
       <p:bldP spid="52" grpId="0" animBg="1"/>
-      <p:bldP spid="53" grpId="0" animBg="1"/>
+      <p:bldP spid="30" grpId="0" animBg="1"/>
+      <p:bldP spid="30" grpId="1" animBg="1"/>
+      <p:bldP spid="31" grpId="0" animBg="1"/>
+      <p:bldP spid="31" grpId="1" animBg="1"/>
     </p:bldLst>
   </p:timing>
 </p:sld>

</xml_diff>